<commit_message>
(sp) remove homeworks and projects / (dt) change figure
</commit_message>
<xml_diff>
--- a/assets/detector/figures.pptx
+++ b/assets/detector/figures.pptx
@@ -263,7 +263,7 @@
           <a:p>
             <a:fld id="{B14EE84C-1BA9-492D-BEBF-4AB0B5FCE851}" type="datetimeFigureOut">
               <a:rPr lang="ko-KR" altLang="en-US" smtClean="0"/>
-              <a:t>2021-02-06</a:t>
+              <a:t>2021-03-03</a:t>
             </a:fld>
             <a:endParaRPr lang="ko-KR" altLang="en-US"/>
           </a:p>
@@ -461,7 +461,7 @@
           <a:p>
             <a:fld id="{B14EE84C-1BA9-492D-BEBF-4AB0B5FCE851}" type="datetimeFigureOut">
               <a:rPr lang="ko-KR" altLang="en-US" smtClean="0"/>
-              <a:t>2021-02-06</a:t>
+              <a:t>2021-03-03</a:t>
             </a:fld>
             <a:endParaRPr lang="ko-KR" altLang="en-US"/>
           </a:p>
@@ -669,7 +669,7 @@
           <a:p>
             <a:fld id="{B14EE84C-1BA9-492D-BEBF-4AB0B5FCE851}" type="datetimeFigureOut">
               <a:rPr lang="ko-KR" altLang="en-US" smtClean="0"/>
-              <a:t>2021-02-06</a:t>
+              <a:t>2021-03-03</a:t>
             </a:fld>
             <a:endParaRPr lang="ko-KR" altLang="en-US"/>
           </a:p>
@@ -867,7 +867,7 @@
           <a:p>
             <a:fld id="{B14EE84C-1BA9-492D-BEBF-4AB0B5FCE851}" type="datetimeFigureOut">
               <a:rPr lang="ko-KR" altLang="en-US" smtClean="0"/>
-              <a:t>2021-02-06</a:t>
+              <a:t>2021-03-03</a:t>
             </a:fld>
             <a:endParaRPr lang="ko-KR" altLang="en-US"/>
           </a:p>
@@ -1142,7 +1142,7 @@
           <a:p>
             <a:fld id="{B14EE84C-1BA9-492D-BEBF-4AB0B5FCE851}" type="datetimeFigureOut">
               <a:rPr lang="ko-KR" altLang="en-US" smtClean="0"/>
-              <a:t>2021-02-06</a:t>
+              <a:t>2021-03-03</a:t>
             </a:fld>
             <a:endParaRPr lang="ko-KR" altLang="en-US"/>
           </a:p>
@@ -1407,7 +1407,7 @@
           <a:p>
             <a:fld id="{B14EE84C-1BA9-492D-BEBF-4AB0B5FCE851}" type="datetimeFigureOut">
               <a:rPr lang="ko-KR" altLang="en-US" smtClean="0"/>
-              <a:t>2021-02-06</a:t>
+              <a:t>2021-03-03</a:t>
             </a:fld>
             <a:endParaRPr lang="ko-KR" altLang="en-US"/>
           </a:p>
@@ -1819,7 +1819,7 @@
           <a:p>
             <a:fld id="{B14EE84C-1BA9-492D-BEBF-4AB0B5FCE851}" type="datetimeFigureOut">
               <a:rPr lang="ko-KR" altLang="en-US" smtClean="0"/>
-              <a:t>2021-02-06</a:t>
+              <a:t>2021-03-03</a:t>
             </a:fld>
             <a:endParaRPr lang="ko-KR" altLang="en-US"/>
           </a:p>
@@ -1960,7 +1960,7 @@
           <a:p>
             <a:fld id="{B14EE84C-1BA9-492D-BEBF-4AB0B5FCE851}" type="datetimeFigureOut">
               <a:rPr lang="ko-KR" altLang="en-US" smtClean="0"/>
-              <a:t>2021-02-06</a:t>
+              <a:t>2021-03-03</a:t>
             </a:fld>
             <a:endParaRPr lang="ko-KR" altLang="en-US"/>
           </a:p>
@@ -2073,7 +2073,7 @@
           <a:p>
             <a:fld id="{B14EE84C-1BA9-492D-BEBF-4AB0B5FCE851}" type="datetimeFigureOut">
               <a:rPr lang="ko-KR" altLang="en-US" smtClean="0"/>
-              <a:t>2021-02-06</a:t>
+              <a:t>2021-03-03</a:t>
             </a:fld>
             <a:endParaRPr lang="ko-KR" altLang="en-US"/>
           </a:p>
@@ -2384,7 +2384,7 @@
           <a:p>
             <a:fld id="{B14EE84C-1BA9-492D-BEBF-4AB0B5FCE851}" type="datetimeFigureOut">
               <a:rPr lang="ko-KR" altLang="en-US" smtClean="0"/>
-              <a:t>2021-02-06</a:t>
+              <a:t>2021-03-03</a:t>
             </a:fld>
             <a:endParaRPr lang="ko-KR" altLang="en-US"/>
           </a:p>
@@ -2672,7 +2672,7 @@
           <a:p>
             <a:fld id="{B14EE84C-1BA9-492D-BEBF-4AB0B5FCE851}" type="datetimeFigureOut">
               <a:rPr lang="ko-KR" altLang="en-US" smtClean="0"/>
-              <a:t>2021-02-06</a:t>
+              <a:t>2021-03-03</a:t>
             </a:fld>
             <a:endParaRPr lang="ko-KR" altLang="en-US"/>
           </a:p>
@@ -2913,7 +2913,7 @@
           <a:p>
             <a:fld id="{B14EE84C-1BA9-492D-BEBF-4AB0B5FCE851}" type="datetimeFigureOut">
               <a:rPr lang="ko-KR" altLang="en-US" smtClean="0"/>
-              <a:t>2021-02-06</a:t>
+              <a:t>2021-03-03</a:t>
             </a:fld>
             <a:endParaRPr lang="ko-KR" altLang="en-US"/>
           </a:p>
@@ -7085,1275 +7085,1042 @@
           <a:chExt cx="0" cy="0"/>
         </a:xfrm>
       </p:grpSpPr>
-      <p:cxnSp>
-        <p:nvCxnSpPr>
-          <p:cNvPr id="70" name="직선 연결선 69">
-            <a:extLst>
-              <a:ext uri="{FF2B5EF4-FFF2-40B4-BE49-F238E27FC236}">
-                <a16:creationId xmlns:a16="http://schemas.microsoft.com/office/drawing/2014/main" id="{6D2DA68E-70A1-40D1-B329-5B35D300ADDB}"/>
-              </a:ext>
-            </a:extLst>
-          </p:cNvPr>
-          <p:cNvCxnSpPr>
-            <a:cxnSpLocks/>
-          </p:cNvCxnSpPr>
+      <p:grpSp>
+        <p:nvGrpSpPr>
+          <p:cNvPr id="13" name="그룹 12">
+            <a:extLst>
+              <a:ext uri="{FF2B5EF4-FFF2-40B4-BE49-F238E27FC236}">
+                <a16:creationId xmlns:a16="http://schemas.microsoft.com/office/drawing/2014/main" id="{1B3116DC-FF0E-40E4-87C5-531D7D4B92B9}"/>
+              </a:ext>
+            </a:extLst>
+          </p:cNvPr>
+          <p:cNvGrpSpPr/>
           <p:nvPr/>
-        </p:nvCxnSpPr>
-        <p:spPr bwMode="auto">
+        </p:nvGrpSpPr>
+        <p:grpSpPr>
           <a:xfrm>
-            <a:off x="5143180" y="992483"/>
-            <a:ext cx="0" cy="1920830"/>
-          </a:xfrm>
-          <a:prstGeom prst="line">
-            <a:avLst/>
-          </a:prstGeom>
-          <a:solidFill>
-            <a:schemeClr val="accent1"/>
-          </a:solidFill>
-          <a:ln w="28575" cap="flat" cmpd="sng" algn="ctr">
-            <a:solidFill>
-              <a:schemeClr val="accent1">
-                <a:lumMod val="75000"/>
-              </a:schemeClr>
-            </a:solidFill>
-            <a:prstDash val="dash"/>
-            <a:round/>
-            <a:headEnd type="none" w="med" len="med"/>
-            <a:tailEnd type="none" w="med" len="med"/>
-          </a:ln>
-          <a:effectLst/>
-        </p:spPr>
-      </p:cxnSp>
-      <p:pic>
-        <p:nvPicPr>
-          <p:cNvPr id="74" name="그림 73">
-            <a:extLst>
-              <a:ext uri="{FF2B5EF4-FFF2-40B4-BE49-F238E27FC236}">
-                <a16:creationId xmlns:a16="http://schemas.microsoft.com/office/drawing/2014/main" id="{FA4066D2-293F-48FA-88E8-6509AB85E744}"/>
-              </a:ext>
-            </a:extLst>
-          </p:cNvPr>
-          <p:cNvPicPr>
-            <a:picLocks noChangeAspect="1"/>
-          </p:cNvPicPr>
-          <p:nvPr/>
-        </p:nvPicPr>
-        <p:blipFill>
-          <a:blip r:embed="rId2"/>
-          <a:stretch>
-            <a:fillRect/>
-          </a:stretch>
-        </p:blipFill>
-        <p:spPr>
-          <a:xfrm>
-            <a:off x="2563500" y="1646290"/>
-            <a:ext cx="2547090" cy="1119367"/>
-          </a:xfrm>
-          <a:prstGeom prst="rect">
-            <a:avLst/>
-          </a:prstGeom>
-        </p:spPr>
-      </p:pic>
-      <p:sp>
-        <p:nvSpPr>
-          <p:cNvPr id="77" name="직사각형 76">
-            <a:extLst>
-              <a:ext uri="{FF2B5EF4-FFF2-40B4-BE49-F238E27FC236}">
-                <a16:creationId xmlns:a16="http://schemas.microsoft.com/office/drawing/2014/main" id="{47BCF327-560E-4EA6-B4F2-C38C4C6EFBCA}"/>
-              </a:ext>
-            </a:extLst>
-          </p:cNvPr>
-          <p:cNvSpPr/>
-          <p:nvPr/>
-        </p:nvSpPr>
-        <p:spPr>
-          <a:xfrm>
-            <a:off x="5205125" y="1559089"/>
-            <a:ext cx="906544" cy="282190"/>
-          </a:xfrm>
-          <a:prstGeom prst="rect">
-            <a:avLst/>
-          </a:prstGeom>
-          <a:noFill/>
-          <a:ln w="28575">
+            <a:off x="2563500" y="832297"/>
+            <a:ext cx="5827262" cy="2092115"/>
+            <a:chOff x="2563500" y="832297"/>
+            <a:chExt cx="5827262" cy="2092115"/>
+          </a:xfrm>
+        </p:grpSpPr>
+        <p:cxnSp>
+          <p:nvCxnSpPr>
+            <p:cNvPr id="70" name="직선 연결선 69">
+              <a:extLst>
+                <a:ext uri="{FF2B5EF4-FFF2-40B4-BE49-F238E27FC236}">
+                  <a16:creationId xmlns:a16="http://schemas.microsoft.com/office/drawing/2014/main" id="{6D2DA68E-70A1-40D1-B329-5B35D300ADDB}"/>
+                </a:ext>
+              </a:extLst>
+            </p:cNvPr>
+            <p:cNvCxnSpPr>
+              <a:cxnSpLocks/>
+            </p:cNvCxnSpPr>
+            <p:nvPr/>
+          </p:nvCxnSpPr>
+          <p:spPr bwMode="auto">
+            <a:xfrm>
+              <a:off x="5143180" y="992483"/>
+              <a:ext cx="0" cy="1824207"/>
+            </a:xfrm>
+            <a:prstGeom prst="line">
+              <a:avLst/>
+            </a:prstGeom>
             <a:solidFill>
               <a:schemeClr val="accent1"/>
             </a:solidFill>
-          </a:ln>
-        </p:spPr>
-        <p:style>
-          <a:lnRef idx="2">
-            <a:schemeClr val="accent1">
-              <a:shade val="50000"/>
-            </a:schemeClr>
-          </a:lnRef>
-          <a:fillRef idx="1">
-            <a:schemeClr val="accent1"/>
-          </a:fillRef>
-          <a:effectRef idx="0">
-            <a:schemeClr val="accent1"/>
-          </a:effectRef>
-          <a:fontRef idx="minor">
-            <a:schemeClr val="lt1"/>
-          </a:fontRef>
-        </p:style>
-        <p:txBody>
-          <a:bodyPr wrap="none" rtlCol="0" anchor="ctr"/>
-          <a:lstStyle/>
-          <a:p>
-            <a:pPr algn="ctr"/>
-            <a:r>
-              <a:rPr lang="en-US" altLang="ko-KR" sz="800" dirty="0">
-                <a:solidFill>
-                  <a:sysClr val="windowText" lastClr="000000"/>
-                </a:solidFill>
-                <a:latin typeface="맑은 고딕" panose="020B0503020000020004" pitchFamily="50" charset="-127"/>
-                <a:ea typeface="LG스마트체 Regular" panose="020B0600000101010101"/>
-              </a:rPr>
-              <a:t>Detection</a:t>
-            </a:r>
-          </a:p>
-          <a:p>
-            <a:pPr algn="ctr"/>
-            <a:r>
-              <a:rPr lang="en-US" altLang="ko-KR" sz="800" dirty="0">
-                <a:solidFill>
-                  <a:sysClr val="windowText" lastClr="000000"/>
-                </a:solidFill>
-                <a:latin typeface="맑은 고딕" panose="020B0503020000020004" pitchFamily="50" charset="-127"/>
-                <a:ea typeface="LG스마트체 Regular" panose="020B0600000101010101"/>
-              </a:rPr>
-              <a:t>(Large scale)</a:t>
-            </a:r>
-          </a:p>
-        </p:txBody>
-      </p:sp>
-      <p:sp>
-        <p:nvSpPr>
-          <p:cNvPr id="96" name="직사각형 95">
-            <a:extLst>
-              <a:ext uri="{FF2B5EF4-FFF2-40B4-BE49-F238E27FC236}">
-                <a16:creationId xmlns:a16="http://schemas.microsoft.com/office/drawing/2014/main" id="{DA9B364E-46F7-4FF6-BEA4-5F92904DCA0B}"/>
-              </a:ext>
-            </a:extLst>
-          </p:cNvPr>
-          <p:cNvSpPr/>
-          <p:nvPr/>
-        </p:nvSpPr>
-        <p:spPr>
-          <a:xfrm>
-            <a:off x="5206802" y="2233813"/>
-            <a:ext cx="906544" cy="282190"/>
-          </a:xfrm>
-          <a:prstGeom prst="rect">
-            <a:avLst/>
-          </a:prstGeom>
-          <a:noFill/>
-          <a:ln w="28575">
+            <a:ln w="28575" cap="flat" cmpd="sng" algn="ctr">
+              <a:solidFill>
+                <a:schemeClr val="accent1">
+                  <a:lumMod val="75000"/>
+                </a:schemeClr>
+              </a:solidFill>
+              <a:prstDash val="dash"/>
+              <a:round/>
+              <a:headEnd type="none" w="med" len="med"/>
+              <a:tailEnd type="none" w="med" len="med"/>
+            </a:ln>
+            <a:effectLst/>
+          </p:spPr>
+        </p:cxnSp>
+        <p:pic>
+          <p:nvPicPr>
+            <p:cNvPr id="74" name="그림 73">
+              <a:extLst>
+                <a:ext uri="{FF2B5EF4-FFF2-40B4-BE49-F238E27FC236}">
+                  <a16:creationId xmlns:a16="http://schemas.microsoft.com/office/drawing/2014/main" id="{FA4066D2-293F-48FA-88E8-6509AB85E744}"/>
+                </a:ext>
+              </a:extLst>
+            </p:cNvPr>
+            <p:cNvPicPr>
+              <a:picLocks noChangeAspect="1"/>
+            </p:cNvPicPr>
+            <p:nvPr/>
+          </p:nvPicPr>
+          <p:blipFill>
+            <a:blip r:embed="rId2"/>
+            <a:stretch>
+              <a:fillRect/>
+            </a:stretch>
+          </p:blipFill>
+          <p:spPr>
+            <a:xfrm>
+              <a:off x="2563500" y="1646290"/>
+              <a:ext cx="2547090" cy="1119367"/>
+            </a:xfrm>
+            <a:prstGeom prst="rect">
+              <a:avLst/>
+            </a:prstGeom>
+          </p:spPr>
+        </p:pic>
+        <p:sp>
+          <p:nvSpPr>
+            <p:cNvPr id="77" name="직사각형 76">
+              <a:extLst>
+                <a:ext uri="{FF2B5EF4-FFF2-40B4-BE49-F238E27FC236}">
+                  <a16:creationId xmlns:a16="http://schemas.microsoft.com/office/drawing/2014/main" id="{47BCF327-560E-4EA6-B4F2-C38C4C6EFBCA}"/>
+                </a:ext>
+              </a:extLst>
+            </p:cNvPr>
+            <p:cNvSpPr/>
+            <p:nvPr/>
+          </p:nvSpPr>
+          <p:spPr>
+            <a:xfrm>
+              <a:off x="5205125" y="1559089"/>
+              <a:ext cx="906544" cy="282190"/>
+            </a:xfrm>
+            <a:prstGeom prst="rect">
+              <a:avLst/>
+            </a:prstGeom>
+            <a:noFill/>
+            <a:ln w="28575">
+              <a:solidFill>
+                <a:schemeClr val="accent1"/>
+              </a:solidFill>
+            </a:ln>
+          </p:spPr>
+          <p:style>
+            <a:lnRef idx="2">
+              <a:schemeClr val="accent1">
+                <a:shade val="50000"/>
+              </a:schemeClr>
+            </a:lnRef>
+            <a:fillRef idx="1">
+              <a:schemeClr val="accent1"/>
+            </a:fillRef>
+            <a:effectRef idx="0">
+              <a:schemeClr val="accent1"/>
+            </a:effectRef>
+            <a:fontRef idx="minor">
+              <a:schemeClr val="lt1"/>
+            </a:fontRef>
+          </p:style>
+          <p:txBody>
+            <a:bodyPr wrap="none" rtlCol="0" anchor="ctr"/>
+            <a:lstStyle/>
+            <a:p>
+              <a:pPr algn="ctr"/>
+              <a:r>
+                <a:rPr lang="en-US" altLang="ko-KR" sz="800" dirty="0">
+                  <a:solidFill>
+                    <a:sysClr val="windowText" lastClr="000000"/>
+                  </a:solidFill>
+                  <a:latin typeface="맑은 고딕" panose="020B0503020000020004" pitchFamily="50" charset="-127"/>
+                  <a:ea typeface="LG스마트체 Regular" panose="020B0600000101010101"/>
+                </a:rPr>
+                <a:t>Detection</a:t>
+              </a:r>
+            </a:p>
+            <a:p>
+              <a:pPr algn="ctr"/>
+              <a:r>
+                <a:rPr lang="en-US" altLang="ko-KR" sz="800" dirty="0">
+                  <a:solidFill>
+                    <a:sysClr val="windowText" lastClr="000000"/>
+                  </a:solidFill>
+                  <a:latin typeface="맑은 고딕" panose="020B0503020000020004" pitchFamily="50" charset="-127"/>
+                  <a:ea typeface="LG스마트체 Regular" panose="020B0600000101010101"/>
+                </a:rPr>
+                <a:t>(Large scale)</a:t>
+              </a:r>
+            </a:p>
+          </p:txBody>
+        </p:sp>
+        <p:sp>
+          <p:nvSpPr>
+            <p:cNvPr id="96" name="직사각형 95">
+              <a:extLst>
+                <a:ext uri="{FF2B5EF4-FFF2-40B4-BE49-F238E27FC236}">
+                  <a16:creationId xmlns:a16="http://schemas.microsoft.com/office/drawing/2014/main" id="{DA9B364E-46F7-4FF6-BEA4-5F92904DCA0B}"/>
+                </a:ext>
+              </a:extLst>
+            </p:cNvPr>
+            <p:cNvSpPr/>
+            <p:nvPr/>
+          </p:nvSpPr>
+          <p:spPr>
+            <a:xfrm>
+              <a:off x="5206802" y="2233813"/>
+              <a:ext cx="906544" cy="282190"/>
+            </a:xfrm>
+            <a:prstGeom prst="rect">
+              <a:avLst/>
+            </a:prstGeom>
+            <a:noFill/>
+            <a:ln w="28575">
+              <a:solidFill>
+                <a:schemeClr val="accent1"/>
+              </a:solidFill>
+            </a:ln>
+          </p:spPr>
+          <p:style>
+            <a:lnRef idx="2">
+              <a:schemeClr val="accent1">
+                <a:shade val="50000"/>
+              </a:schemeClr>
+            </a:lnRef>
+            <a:fillRef idx="1">
+              <a:schemeClr val="accent1"/>
+            </a:fillRef>
+            <a:effectRef idx="0">
+              <a:schemeClr val="accent1"/>
+            </a:effectRef>
+            <a:fontRef idx="minor">
+              <a:schemeClr val="lt1"/>
+            </a:fontRef>
+          </p:style>
+          <p:txBody>
+            <a:bodyPr wrap="none" rtlCol="0" anchor="ctr"/>
+            <a:lstStyle/>
+            <a:p>
+              <a:pPr algn="ctr"/>
+              <a:r>
+                <a:rPr lang="en-US" altLang="ko-KR" sz="800" dirty="0">
+                  <a:solidFill>
+                    <a:sysClr val="windowText" lastClr="000000"/>
+                  </a:solidFill>
+                  <a:latin typeface="맑은 고딕" panose="020B0503020000020004" pitchFamily="50" charset="-127"/>
+                  <a:ea typeface="LG스마트체 Regular" panose="020B0600000101010101"/>
+                </a:rPr>
+                <a:t>Detection</a:t>
+              </a:r>
+            </a:p>
+            <a:p>
+              <a:pPr algn="ctr"/>
+              <a:r>
+                <a:rPr lang="en-US" altLang="ko-KR" sz="800" dirty="0">
+                  <a:solidFill>
+                    <a:sysClr val="windowText" lastClr="000000"/>
+                  </a:solidFill>
+                  <a:latin typeface="맑은 고딕" panose="020B0503020000020004" pitchFamily="50" charset="-127"/>
+                  <a:ea typeface="LG스마트체 Regular" panose="020B0600000101010101"/>
+                </a:rPr>
+                <a:t>(Small scale)</a:t>
+              </a:r>
+            </a:p>
+          </p:txBody>
+        </p:sp>
+        <p:sp>
+          <p:nvSpPr>
+            <p:cNvPr id="97" name="직사각형 96">
+              <a:extLst>
+                <a:ext uri="{FF2B5EF4-FFF2-40B4-BE49-F238E27FC236}">
+                  <a16:creationId xmlns:a16="http://schemas.microsoft.com/office/drawing/2014/main" id="{371B6347-E8A8-4608-9BB2-2B68991B0005}"/>
+                </a:ext>
+              </a:extLst>
+            </p:cNvPr>
+            <p:cNvSpPr/>
+            <p:nvPr/>
+          </p:nvSpPr>
+          <p:spPr>
+            <a:xfrm>
+              <a:off x="5204237" y="1889463"/>
+              <a:ext cx="906544" cy="282190"/>
+            </a:xfrm>
+            <a:prstGeom prst="rect">
+              <a:avLst/>
+            </a:prstGeom>
+            <a:noFill/>
+            <a:ln w="28575">
+              <a:solidFill>
+                <a:schemeClr val="accent1"/>
+              </a:solidFill>
+            </a:ln>
+          </p:spPr>
+          <p:style>
+            <a:lnRef idx="2">
+              <a:schemeClr val="accent1">
+                <a:shade val="50000"/>
+              </a:schemeClr>
+            </a:lnRef>
+            <a:fillRef idx="1">
+              <a:schemeClr val="accent1"/>
+            </a:fillRef>
+            <a:effectRef idx="0">
+              <a:schemeClr val="accent1"/>
+            </a:effectRef>
+            <a:fontRef idx="minor">
+              <a:schemeClr val="lt1"/>
+            </a:fontRef>
+          </p:style>
+          <p:txBody>
+            <a:bodyPr wrap="none" rtlCol="0" anchor="ctr"/>
+            <a:lstStyle/>
+            <a:p>
+              <a:pPr algn="ctr"/>
+              <a:r>
+                <a:rPr lang="en-US" altLang="ko-KR" sz="800" dirty="0">
+                  <a:solidFill>
+                    <a:sysClr val="windowText" lastClr="000000"/>
+                  </a:solidFill>
+                  <a:latin typeface="맑은 고딕" panose="020B0503020000020004" pitchFamily="50" charset="-127"/>
+                  <a:ea typeface="LG스마트체 Regular" panose="020B0600000101010101"/>
+                </a:rPr>
+                <a:t>Detection</a:t>
+              </a:r>
+            </a:p>
+            <a:p>
+              <a:pPr algn="ctr"/>
+              <a:r>
+                <a:rPr lang="en-US" altLang="ko-KR" sz="800" dirty="0">
+                  <a:solidFill>
+                    <a:sysClr val="windowText" lastClr="000000"/>
+                  </a:solidFill>
+                  <a:latin typeface="맑은 고딕" panose="020B0503020000020004" pitchFamily="50" charset="-127"/>
+                  <a:ea typeface="LG스마트체 Regular" panose="020B0600000101010101"/>
+                </a:rPr>
+                <a:t>(Medium scale)</a:t>
+              </a:r>
+            </a:p>
+          </p:txBody>
+        </p:sp>
+        <p:sp>
+          <p:nvSpPr>
+            <p:cNvPr id="125" name="TextBox 124">
+              <a:extLst>
+                <a:ext uri="{FF2B5EF4-FFF2-40B4-BE49-F238E27FC236}">
+                  <a16:creationId xmlns:a16="http://schemas.microsoft.com/office/drawing/2014/main" id="{C77D23C8-5295-4CF0-8420-1EEC22AA45F2}"/>
+                </a:ext>
+              </a:extLst>
+            </p:cNvPr>
+            <p:cNvSpPr txBox="1"/>
+            <p:nvPr/>
+          </p:nvSpPr>
+          <p:spPr>
+            <a:xfrm>
+              <a:off x="2745667" y="2708968"/>
+              <a:ext cx="766998" cy="215444"/>
+            </a:xfrm>
+            <a:prstGeom prst="rect">
+              <a:avLst/>
+            </a:prstGeom>
+            <a:noFill/>
+          </p:spPr>
+          <p:txBody>
+            <a:bodyPr wrap="square" rtlCol="0">
+              <a:spAutoFit/>
+            </a:bodyPr>
+            <a:lstStyle/>
+            <a:p>
+              <a:pPr algn="ctr"/>
+              <a:r>
+                <a:rPr lang="ko-KR" altLang="en-US" sz="800" dirty="0">
+                  <a:latin typeface="맑은 고딕" panose="020B0503020000020004" pitchFamily="50" charset="-127"/>
+                  <a:ea typeface="LG스마트체 Regular" panose="020B0600000101010101"/>
+                  <a:cs typeface="Arial" panose="020B0604020202020204" pitchFamily="34" charset="0"/>
+                </a:rPr>
+                <a:t>입력 이미지</a:t>
+              </a:r>
+            </a:p>
+          </p:txBody>
+        </p:sp>
+        <p:sp>
+          <p:nvSpPr>
+            <p:cNvPr id="72" name="TextBox 71">
+              <a:extLst>
+                <a:ext uri="{FF2B5EF4-FFF2-40B4-BE49-F238E27FC236}">
+                  <a16:creationId xmlns:a16="http://schemas.microsoft.com/office/drawing/2014/main" id="{BF956676-0A1D-4F17-8244-6008CB28AFB2}"/>
+                </a:ext>
+              </a:extLst>
+            </p:cNvPr>
+            <p:cNvSpPr txBox="1"/>
+            <p:nvPr/>
+          </p:nvSpPr>
+          <p:spPr>
+            <a:xfrm>
+              <a:off x="3014276" y="852478"/>
+              <a:ext cx="1645539" cy="540053"/>
+            </a:xfrm>
+            <a:prstGeom prst="rect">
+              <a:avLst/>
+            </a:prstGeom>
+            <a:noFill/>
+          </p:spPr>
+          <p:txBody>
+            <a:bodyPr wrap="none" rtlCol="0">
+              <a:spAutoFit/>
+            </a:bodyPr>
+            <a:lstStyle/>
+            <a:p>
+              <a:pPr algn="ctr">
+                <a:spcAft>
+                  <a:spcPts val="600"/>
+                </a:spcAft>
+              </a:pPr>
+              <a:r>
+                <a:rPr lang="en-US" altLang="ko-KR" sz="1400" u="sng" dirty="0">
+                  <a:latin typeface="맑은 고딕" panose="020B0503020000020004" pitchFamily="50" charset="-127"/>
+                  <a:ea typeface="맑은 고딕" panose="020B0503020000020004" pitchFamily="50" charset="-127"/>
+                </a:rPr>
+                <a:t>Backbone network</a:t>
+              </a:r>
+            </a:p>
+            <a:p>
+              <a:pPr algn="ctr">
+                <a:spcAft>
+                  <a:spcPts val="600"/>
+                </a:spcAft>
+              </a:pPr>
+              <a:r>
+                <a:rPr lang="en-US" altLang="ko-KR" sz="1200" dirty="0">
+                  <a:latin typeface="맑은 고딕" panose="020B0503020000020004" pitchFamily="50" charset="-127"/>
+                  <a:ea typeface="맑은 고딕" panose="020B0503020000020004" pitchFamily="50" charset="-127"/>
+                </a:rPr>
+                <a:t>: Feature</a:t>
+              </a:r>
+              <a:r>
+                <a:rPr lang="ko-KR" altLang="en-US" sz="1200" dirty="0">
+                  <a:latin typeface="맑은 고딕" panose="020B0503020000020004" pitchFamily="50" charset="-127"/>
+                  <a:ea typeface="맑은 고딕" panose="020B0503020000020004" pitchFamily="50" charset="-127"/>
+                </a:rPr>
+                <a:t> </a:t>
+              </a:r>
+              <a:r>
+                <a:rPr lang="en-US" altLang="ko-KR" sz="1200" dirty="0">
+                  <a:latin typeface="맑은 고딕" panose="020B0503020000020004" pitchFamily="50" charset="-127"/>
+                  <a:ea typeface="맑은 고딕" panose="020B0503020000020004" pitchFamily="50" charset="-127"/>
+                </a:rPr>
+                <a:t>map</a:t>
+              </a:r>
+              <a:r>
+                <a:rPr lang="ko-KR" altLang="en-US" sz="1200" dirty="0">
+                  <a:latin typeface="맑은 고딕" panose="020B0503020000020004" pitchFamily="50" charset="-127"/>
+                  <a:ea typeface="맑은 고딕" panose="020B0503020000020004" pitchFamily="50" charset="-127"/>
+                </a:rPr>
+                <a:t> 추출</a:t>
+              </a:r>
+            </a:p>
+          </p:txBody>
+        </p:sp>
+        <p:sp>
+          <p:nvSpPr>
+            <p:cNvPr id="73" name="TextBox 72">
+              <a:extLst>
+                <a:ext uri="{FF2B5EF4-FFF2-40B4-BE49-F238E27FC236}">
+                  <a16:creationId xmlns:a16="http://schemas.microsoft.com/office/drawing/2014/main" id="{D1429D8B-5A03-4DA3-A617-4315267AE7CF}"/>
+                </a:ext>
+              </a:extLst>
+            </p:cNvPr>
+            <p:cNvSpPr txBox="1"/>
+            <p:nvPr/>
+          </p:nvSpPr>
+          <p:spPr>
+            <a:xfrm>
+              <a:off x="6176564" y="832297"/>
+              <a:ext cx="1418629" cy="540053"/>
+            </a:xfrm>
+            <a:prstGeom prst="rect">
+              <a:avLst/>
+            </a:prstGeom>
+            <a:noFill/>
+          </p:spPr>
+          <p:txBody>
+            <a:bodyPr wrap="none" rtlCol="0">
+              <a:spAutoFit/>
+            </a:bodyPr>
+            <a:lstStyle/>
+            <a:p>
+              <a:pPr algn="ctr">
+                <a:spcAft>
+                  <a:spcPts val="600"/>
+                </a:spcAft>
+              </a:pPr>
+              <a:r>
+                <a:rPr lang="en-US" altLang="ko-KR" sz="1400" u="sng" dirty="0">
+                  <a:latin typeface="맑은 고딕" panose="020B0503020000020004" pitchFamily="50" charset="-127"/>
+                  <a:ea typeface="맑은 고딕" panose="020B0503020000020004" pitchFamily="50" charset="-127"/>
+                </a:rPr>
+                <a:t>Detection Head</a:t>
+              </a:r>
+            </a:p>
+            <a:p>
+              <a:pPr algn="ctr">
+                <a:spcAft>
+                  <a:spcPts val="600"/>
+                </a:spcAft>
+              </a:pPr>
+              <a:r>
+                <a:rPr lang="en-US" altLang="ko-KR" sz="1200" dirty="0">
+                  <a:latin typeface="맑은 고딕" panose="020B0503020000020004" pitchFamily="50" charset="-127"/>
+                  <a:ea typeface="맑은 고딕" panose="020B0503020000020004" pitchFamily="50" charset="-127"/>
+                </a:rPr>
+                <a:t>: </a:t>
+              </a:r>
+              <a:r>
+                <a:rPr lang="ko-KR" altLang="en-US" sz="1200" dirty="0">
+                  <a:latin typeface="맑은 고딕" panose="020B0503020000020004" pitchFamily="50" charset="-127"/>
+                  <a:ea typeface="맑은 고딕" panose="020B0503020000020004" pitchFamily="50" charset="-127"/>
+                </a:rPr>
+                <a:t>검출 결과 출력</a:t>
+              </a:r>
+            </a:p>
+          </p:txBody>
+        </p:sp>
+        <p:sp>
+          <p:nvSpPr>
+            <p:cNvPr id="180" name="TextBox 179">
+              <a:extLst>
+                <a:ext uri="{FF2B5EF4-FFF2-40B4-BE49-F238E27FC236}">
+                  <a16:creationId xmlns:a16="http://schemas.microsoft.com/office/drawing/2014/main" id="{0DF85E12-C826-44B1-882E-02C8C5E92409}"/>
+                </a:ext>
+              </a:extLst>
+            </p:cNvPr>
+            <p:cNvSpPr txBox="1"/>
+            <p:nvPr/>
+          </p:nvSpPr>
+          <p:spPr>
+            <a:xfrm>
+              <a:off x="2940813" y="1493209"/>
+              <a:ext cx="899277" cy="153888"/>
+            </a:xfrm>
+            <a:prstGeom prst="rect">
+              <a:avLst/>
+            </a:prstGeom>
             <a:solidFill>
-              <a:schemeClr val="accent1"/>
+              <a:schemeClr val="bg1">
+                <a:alpha val="70000"/>
+              </a:schemeClr>
             </a:solidFill>
-          </a:ln>
-        </p:spPr>
-        <p:style>
-          <a:lnRef idx="2">
-            <a:schemeClr val="accent1">
-              <a:shade val="50000"/>
-            </a:schemeClr>
-          </a:lnRef>
-          <a:fillRef idx="1">
-            <a:schemeClr val="accent1"/>
-          </a:fillRef>
-          <a:effectRef idx="0">
-            <a:schemeClr val="accent1"/>
-          </a:effectRef>
-          <a:fontRef idx="minor">
-            <a:schemeClr val="lt1"/>
-          </a:fontRef>
-        </p:style>
-        <p:txBody>
-          <a:bodyPr wrap="none" rtlCol="0" anchor="ctr"/>
-          <a:lstStyle/>
-          <a:p>
-            <a:pPr algn="ctr"/>
-            <a:r>
-              <a:rPr lang="en-US" altLang="ko-KR" sz="800" dirty="0">
-                <a:solidFill>
-                  <a:sysClr val="windowText" lastClr="000000"/>
-                </a:solidFill>
-                <a:latin typeface="맑은 고딕" panose="020B0503020000020004" pitchFamily="50" charset="-127"/>
-                <a:ea typeface="LG스마트체 Regular" panose="020B0600000101010101"/>
-              </a:rPr>
-              <a:t>Detection</a:t>
-            </a:r>
-          </a:p>
-          <a:p>
-            <a:pPr algn="ctr"/>
-            <a:r>
-              <a:rPr lang="en-US" altLang="ko-KR" sz="800" dirty="0">
-                <a:solidFill>
-                  <a:sysClr val="windowText" lastClr="000000"/>
-                </a:solidFill>
-                <a:latin typeface="맑은 고딕" panose="020B0503020000020004" pitchFamily="50" charset="-127"/>
-                <a:ea typeface="LG스마트체 Regular" panose="020B0600000101010101"/>
-              </a:rPr>
-              <a:t>(Small scale)</a:t>
-            </a:r>
-          </a:p>
-        </p:txBody>
-      </p:sp>
-      <p:sp>
-        <p:nvSpPr>
-          <p:cNvPr id="97" name="직사각형 96">
-            <a:extLst>
-              <a:ext uri="{FF2B5EF4-FFF2-40B4-BE49-F238E27FC236}">
-                <a16:creationId xmlns:a16="http://schemas.microsoft.com/office/drawing/2014/main" id="{371B6347-E8A8-4608-9BB2-2B68991B0005}"/>
-              </a:ext>
-            </a:extLst>
-          </p:cNvPr>
-          <p:cNvSpPr/>
-          <p:nvPr/>
-        </p:nvSpPr>
-        <p:spPr>
-          <a:xfrm>
-            <a:off x="5204237" y="1889463"/>
-            <a:ext cx="906544" cy="282190"/>
-          </a:xfrm>
-          <a:prstGeom prst="rect">
-            <a:avLst/>
-          </a:prstGeom>
-          <a:noFill/>
-          <a:ln w="28575">
-            <a:solidFill>
-              <a:schemeClr val="accent1"/>
-            </a:solidFill>
-          </a:ln>
-        </p:spPr>
-        <p:style>
-          <a:lnRef idx="2">
-            <a:schemeClr val="accent1">
-              <a:shade val="50000"/>
-            </a:schemeClr>
-          </a:lnRef>
-          <a:fillRef idx="1">
-            <a:schemeClr val="accent1"/>
-          </a:fillRef>
-          <a:effectRef idx="0">
-            <a:schemeClr val="accent1"/>
-          </a:effectRef>
-          <a:fontRef idx="minor">
-            <a:schemeClr val="lt1"/>
-          </a:fontRef>
-        </p:style>
-        <p:txBody>
-          <a:bodyPr wrap="none" rtlCol="0" anchor="ctr"/>
-          <a:lstStyle/>
-          <a:p>
-            <a:pPr algn="ctr"/>
-            <a:r>
-              <a:rPr lang="en-US" altLang="ko-KR" sz="800" dirty="0">
-                <a:solidFill>
-                  <a:sysClr val="windowText" lastClr="000000"/>
-                </a:solidFill>
-                <a:latin typeface="맑은 고딕" panose="020B0503020000020004" pitchFamily="50" charset="-127"/>
-                <a:ea typeface="LG스마트체 Regular" panose="020B0600000101010101"/>
-              </a:rPr>
-              <a:t>Detection</a:t>
-            </a:r>
-          </a:p>
-          <a:p>
-            <a:pPr algn="ctr"/>
-            <a:r>
-              <a:rPr lang="en-US" altLang="ko-KR" sz="800" dirty="0">
-                <a:solidFill>
-                  <a:sysClr val="windowText" lastClr="000000"/>
-                </a:solidFill>
-                <a:latin typeface="맑은 고딕" panose="020B0503020000020004" pitchFamily="50" charset="-127"/>
-                <a:ea typeface="LG스마트체 Regular" panose="020B0600000101010101"/>
-              </a:rPr>
-              <a:t>(Medium scale)</a:t>
-            </a:r>
-          </a:p>
-        </p:txBody>
-      </p:sp>
-      <p:sp>
-        <p:nvSpPr>
-          <p:cNvPr id="125" name="TextBox 124">
-            <a:extLst>
-              <a:ext uri="{FF2B5EF4-FFF2-40B4-BE49-F238E27FC236}">
-                <a16:creationId xmlns:a16="http://schemas.microsoft.com/office/drawing/2014/main" id="{C77D23C8-5295-4CF0-8420-1EEC22AA45F2}"/>
-              </a:ext>
-            </a:extLst>
-          </p:cNvPr>
-          <p:cNvSpPr txBox="1"/>
-          <p:nvPr/>
-        </p:nvSpPr>
-        <p:spPr>
-          <a:xfrm>
-            <a:off x="2745667" y="2708968"/>
-            <a:ext cx="766998" cy="204345"/>
-          </a:xfrm>
-          <a:prstGeom prst="rect">
-            <a:avLst/>
-          </a:prstGeom>
-          <a:noFill/>
-        </p:spPr>
-        <p:txBody>
-          <a:bodyPr wrap="square" rtlCol="0">
-            <a:spAutoFit/>
-          </a:bodyPr>
-          <a:lstStyle/>
-          <a:p>
-            <a:pPr algn="ctr"/>
-            <a:r>
-              <a:rPr lang="ko-KR" altLang="en-US" sz="800" dirty="0" err="1">
+          </p:spPr>
+          <p:txBody>
+            <a:bodyPr wrap="square" lIns="0" tIns="0" rIns="0" bIns="0" rtlCol="0">
+              <a:spAutoFit/>
+            </a:bodyPr>
+            <a:lstStyle/>
+            <a:p>
+              <a:r>
+                <a:rPr lang="en-US" altLang="ko-KR" sz="1000" dirty="0">
+                  <a:latin typeface="맑은 고딕" panose="020B0503020000020004" pitchFamily="50" charset="-127"/>
+                  <a:ea typeface="LG스마트체 Regular" panose="020B0600000101010101"/>
+                  <a:cs typeface="Arial" panose="020B0604020202020204" pitchFamily="34" charset="0"/>
+                </a:rPr>
+                <a:t>Darknet-53</a:t>
+              </a:r>
+              <a:endParaRPr lang="ko-KR" altLang="en-US" sz="1000" dirty="0">
                 <a:latin typeface="맑은 고딕" panose="020B0503020000020004" pitchFamily="50" charset="-127"/>
                 <a:ea typeface="LG스마트체 Regular" panose="020B0600000101010101"/>
                 <a:cs typeface="Arial" panose="020B0604020202020204" pitchFamily="34" charset="0"/>
-              </a:rPr>
-              <a:t>입력이미지</a:t>
-            </a:r>
-            <a:endParaRPr lang="ko-KR" altLang="en-US" sz="800" dirty="0">
-              <a:latin typeface="맑은 고딕" panose="020B0503020000020004" pitchFamily="50" charset="-127"/>
-              <a:ea typeface="LG스마트체 Regular" panose="020B0600000101010101"/>
-              <a:cs typeface="Arial" panose="020B0604020202020204" pitchFamily="34" charset="0"/>
-            </a:endParaRPr>
-          </a:p>
-        </p:txBody>
-      </p:sp>
-      <p:sp>
-        <p:nvSpPr>
-          <p:cNvPr id="72" name="TextBox 71">
-            <a:extLst>
-              <a:ext uri="{FF2B5EF4-FFF2-40B4-BE49-F238E27FC236}">
-                <a16:creationId xmlns:a16="http://schemas.microsoft.com/office/drawing/2014/main" id="{BF956676-0A1D-4F17-8244-6008CB28AFB2}"/>
-              </a:ext>
-            </a:extLst>
-          </p:cNvPr>
-          <p:cNvSpPr txBox="1"/>
-          <p:nvPr/>
-        </p:nvSpPr>
-        <p:spPr>
-          <a:xfrm>
-            <a:off x="3014276" y="852478"/>
-            <a:ext cx="1645539" cy="540053"/>
-          </a:xfrm>
-          <a:prstGeom prst="rect">
-            <a:avLst/>
-          </a:prstGeom>
-          <a:noFill/>
-        </p:spPr>
-        <p:txBody>
-          <a:bodyPr wrap="none" rtlCol="0">
-            <a:spAutoFit/>
-          </a:bodyPr>
-          <a:lstStyle/>
-          <a:p>
-            <a:pPr algn="ctr">
-              <a:spcAft>
-                <a:spcPts val="600"/>
-              </a:spcAft>
-            </a:pPr>
-            <a:r>
-              <a:rPr lang="en-US" altLang="ko-KR" sz="1400" u="sng" dirty="0">
-                <a:latin typeface="맑은 고딕" panose="020B0503020000020004" pitchFamily="50" charset="-127"/>
-                <a:ea typeface="맑은 고딕" panose="020B0503020000020004" pitchFamily="50" charset="-127"/>
-              </a:rPr>
-              <a:t>Backbone network</a:t>
-            </a:r>
-          </a:p>
-          <a:p>
-            <a:pPr algn="ctr">
-              <a:spcAft>
-                <a:spcPts val="600"/>
-              </a:spcAft>
-            </a:pPr>
-            <a:r>
-              <a:rPr lang="en-US" altLang="ko-KR" sz="1200" dirty="0">
-                <a:latin typeface="맑은 고딕" panose="020B0503020000020004" pitchFamily="50" charset="-127"/>
-                <a:ea typeface="맑은 고딕" panose="020B0503020000020004" pitchFamily="50" charset="-127"/>
-              </a:rPr>
-              <a:t>: Feature</a:t>
-            </a:r>
-            <a:r>
-              <a:rPr lang="ko-KR" altLang="en-US" sz="1200" dirty="0">
-                <a:latin typeface="맑은 고딕" panose="020B0503020000020004" pitchFamily="50" charset="-127"/>
-                <a:ea typeface="맑은 고딕" panose="020B0503020000020004" pitchFamily="50" charset="-127"/>
-              </a:rPr>
-              <a:t> </a:t>
-            </a:r>
-            <a:r>
-              <a:rPr lang="en-US" altLang="ko-KR" sz="1200" dirty="0">
-                <a:latin typeface="맑은 고딕" panose="020B0503020000020004" pitchFamily="50" charset="-127"/>
-                <a:ea typeface="맑은 고딕" panose="020B0503020000020004" pitchFamily="50" charset="-127"/>
-              </a:rPr>
-              <a:t>map</a:t>
-            </a:r>
-            <a:r>
-              <a:rPr lang="ko-KR" altLang="en-US" sz="1200" dirty="0">
-                <a:latin typeface="맑은 고딕" panose="020B0503020000020004" pitchFamily="50" charset="-127"/>
-                <a:ea typeface="맑은 고딕" panose="020B0503020000020004" pitchFamily="50" charset="-127"/>
-              </a:rPr>
-              <a:t> 추출</a:t>
-            </a:r>
-          </a:p>
-        </p:txBody>
-      </p:sp>
-      <p:sp>
-        <p:nvSpPr>
-          <p:cNvPr id="73" name="TextBox 72">
-            <a:extLst>
-              <a:ext uri="{FF2B5EF4-FFF2-40B4-BE49-F238E27FC236}">
-                <a16:creationId xmlns:a16="http://schemas.microsoft.com/office/drawing/2014/main" id="{D1429D8B-5A03-4DA3-A617-4315267AE7CF}"/>
-              </a:ext>
-            </a:extLst>
-          </p:cNvPr>
-          <p:cNvSpPr txBox="1"/>
-          <p:nvPr/>
-        </p:nvSpPr>
-        <p:spPr>
-          <a:xfrm>
-            <a:off x="6176564" y="832297"/>
-            <a:ext cx="1418629" cy="540053"/>
-          </a:xfrm>
-          <a:prstGeom prst="rect">
-            <a:avLst/>
-          </a:prstGeom>
-          <a:noFill/>
-        </p:spPr>
-        <p:txBody>
-          <a:bodyPr wrap="none" rtlCol="0">
-            <a:spAutoFit/>
-          </a:bodyPr>
-          <a:lstStyle/>
-          <a:p>
-            <a:pPr algn="ctr">
-              <a:spcAft>
-                <a:spcPts val="600"/>
-              </a:spcAft>
-            </a:pPr>
-            <a:r>
-              <a:rPr lang="en-US" altLang="ko-KR" sz="1400" u="sng" dirty="0">
-                <a:latin typeface="맑은 고딕" panose="020B0503020000020004" pitchFamily="50" charset="-127"/>
-                <a:ea typeface="맑은 고딕" panose="020B0503020000020004" pitchFamily="50" charset="-127"/>
-              </a:rPr>
-              <a:t>Detection Head</a:t>
-            </a:r>
-          </a:p>
-          <a:p>
-            <a:pPr algn="ctr">
-              <a:spcAft>
-                <a:spcPts val="600"/>
-              </a:spcAft>
-            </a:pPr>
-            <a:r>
-              <a:rPr lang="en-US" altLang="ko-KR" sz="1200" dirty="0">
-                <a:latin typeface="맑은 고딕" panose="020B0503020000020004" pitchFamily="50" charset="-127"/>
-                <a:ea typeface="맑은 고딕" panose="020B0503020000020004" pitchFamily="50" charset="-127"/>
-              </a:rPr>
-              <a:t>: </a:t>
-            </a:r>
-            <a:r>
-              <a:rPr lang="ko-KR" altLang="en-US" sz="1200" dirty="0">
-                <a:latin typeface="맑은 고딕" panose="020B0503020000020004" pitchFamily="50" charset="-127"/>
-                <a:ea typeface="맑은 고딕" panose="020B0503020000020004" pitchFamily="50" charset="-127"/>
-              </a:rPr>
-              <a:t>검출 결과 출력</a:t>
-            </a:r>
-          </a:p>
-        </p:txBody>
-      </p:sp>
-      <p:sp>
-        <p:nvSpPr>
-          <p:cNvPr id="180" name="TextBox 179">
-            <a:extLst>
-              <a:ext uri="{FF2B5EF4-FFF2-40B4-BE49-F238E27FC236}">
-                <a16:creationId xmlns:a16="http://schemas.microsoft.com/office/drawing/2014/main" id="{0DF85E12-C826-44B1-882E-02C8C5E92409}"/>
-              </a:ext>
-            </a:extLst>
-          </p:cNvPr>
-          <p:cNvSpPr txBox="1"/>
-          <p:nvPr/>
-        </p:nvSpPr>
-        <p:spPr>
-          <a:xfrm>
-            <a:off x="2940813" y="1493209"/>
-            <a:ext cx="899277" cy="153888"/>
-          </a:xfrm>
-          <a:prstGeom prst="rect">
-            <a:avLst/>
-          </a:prstGeom>
-          <a:solidFill>
-            <a:schemeClr val="bg1">
-              <a:alpha val="70000"/>
-            </a:schemeClr>
-          </a:solidFill>
-        </p:spPr>
-        <p:txBody>
-          <a:bodyPr wrap="square" lIns="0" tIns="0" rIns="0" bIns="0" rtlCol="0">
-            <a:spAutoFit/>
-          </a:bodyPr>
-          <a:lstStyle/>
-          <a:p>
-            <a:r>
-              <a:rPr lang="en-US" altLang="ko-KR" sz="1000" dirty="0">
+              </a:endParaRPr>
+            </a:p>
+          </p:txBody>
+        </p:sp>
+        <p:sp>
+          <p:nvSpPr>
+            <p:cNvPr id="181" name="TextBox 180">
+              <a:extLst>
+                <a:ext uri="{FF2B5EF4-FFF2-40B4-BE49-F238E27FC236}">
+                  <a16:creationId xmlns:a16="http://schemas.microsoft.com/office/drawing/2014/main" id="{CB86DC95-B729-4634-B150-5AE9458542EB}"/>
+                </a:ext>
+              </a:extLst>
+            </p:cNvPr>
+            <p:cNvSpPr txBox="1"/>
+            <p:nvPr/>
+          </p:nvSpPr>
+          <p:spPr>
+            <a:xfrm>
+              <a:off x="3962671" y="1394765"/>
+              <a:ext cx="1138110" cy="307777"/>
+            </a:xfrm>
+            <a:prstGeom prst="rect">
+              <a:avLst/>
+            </a:prstGeom>
+            <a:solidFill>
+              <a:schemeClr val="bg1">
+                <a:alpha val="70000"/>
+              </a:schemeClr>
+            </a:solidFill>
+          </p:spPr>
+          <p:txBody>
+            <a:bodyPr wrap="square" lIns="0" tIns="0" rIns="0" bIns="0" rtlCol="0">
+              <a:spAutoFit/>
+            </a:bodyPr>
+            <a:lstStyle/>
+            <a:p>
+              <a:pPr algn="ctr"/>
+              <a:r>
+                <a:rPr lang="en-US" altLang="ko-KR" sz="1000" dirty="0">
+                  <a:latin typeface="맑은 고딕" panose="020B0503020000020004" pitchFamily="50" charset="-127"/>
+                  <a:ea typeface="LG스마트체 Regular" panose="020B0600000101010101"/>
+                  <a:cs typeface="Arial" panose="020B0604020202020204" pitchFamily="34" charset="0"/>
+                </a:rPr>
+                <a:t>Feature Pyramid </a:t>
+              </a:r>
+            </a:p>
+            <a:p>
+              <a:pPr algn="ctr"/>
+              <a:r>
+                <a:rPr lang="en-US" altLang="ko-KR" sz="1000" dirty="0">
+                  <a:latin typeface="맑은 고딕" panose="020B0503020000020004" pitchFamily="50" charset="-127"/>
+                  <a:ea typeface="LG스마트체 Regular" panose="020B0600000101010101"/>
+                  <a:cs typeface="Arial" panose="020B0604020202020204" pitchFamily="34" charset="0"/>
+                </a:rPr>
+                <a:t>Network</a:t>
+              </a:r>
+              <a:endParaRPr lang="ko-KR" altLang="en-US" sz="1000" dirty="0">
                 <a:latin typeface="맑은 고딕" panose="020B0503020000020004" pitchFamily="50" charset="-127"/>
                 <a:ea typeface="LG스마트체 Regular" panose="020B0600000101010101"/>
                 <a:cs typeface="Arial" panose="020B0604020202020204" pitchFamily="34" charset="0"/>
-              </a:rPr>
-              <a:t>Darknet-53</a:t>
-            </a:r>
-            <a:endParaRPr lang="ko-KR" altLang="en-US" sz="1000" dirty="0">
-              <a:latin typeface="맑은 고딕" panose="020B0503020000020004" pitchFamily="50" charset="-127"/>
-              <a:ea typeface="LG스마트체 Regular" panose="020B0600000101010101"/>
-              <a:cs typeface="Arial" panose="020B0604020202020204" pitchFamily="34" charset="0"/>
-            </a:endParaRPr>
-          </a:p>
-        </p:txBody>
-      </p:sp>
-      <p:sp>
-        <p:nvSpPr>
-          <p:cNvPr id="181" name="TextBox 180">
-            <a:extLst>
-              <a:ext uri="{FF2B5EF4-FFF2-40B4-BE49-F238E27FC236}">
-                <a16:creationId xmlns:a16="http://schemas.microsoft.com/office/drawing/2014/main" id="{CB86DC95-B729-4634-B150-5AE9458542EB}"/>
-              </a:ext>
-            </a:extLst>
-          </p:cNvPr>
-          <p:cNvSpPr txBox="1"/>
-          <p:nvPr/>
-        </p:nvSpPr>
-        <p:spPr>
-          <a:xfrm>
-            <a:off x="3962671" y="1394765"/>
-            <a:ext cx="1138110" cy="307777"/>
-          </a:xfrm>
-          <a:prstGeom prst="rect">
-            <a:avLst/>
-          </a:prstGeom>
-          <a:solidFill>
-            <a:schemeClr val="bg1">
-              <a:alpha val="70000"/>
-            </a:schemeClr>
-          </a:solidFill>
-        </p:spPr>
-        <p:txBody>
-          <a:bodyPr wrap="square" lIns="0" tIns="0" rIns="0" bIns="0" rtlCol="0">
-            <a:spAutoFit/>
-          </a:bodyPr>
-          <a:lstStyle/>
-          <a:p>
-            <a:pPr algn="ctr"/>
-            <a:r>
-              <a:rPr lang="en-US" altLang="ko-KR" sz="1000" dirty="0">
+              </a:endParaRPr>
+            </a:p>
+          </p:txBody>
+        </p:sp>
+        <p:cxnSp>
+          <p:nvCxnSpPr>
+            <p:cNvPr id="122" name="직선 연결선 121">
+              <a:extLst>
+                <a:ext uri="{FF2B5EF4-FFF2-40B4-BE49-F238E27FC236}">
+                  <a16:creationId xmlns:a16="http://schemas.microsoft.com/office/drawing/2014/main" id="{95A7932F-CD14-4047-A700-03C4B7C7F910}"/>
+                </a:ext>
+              </a:extLst>
+            </p:cNvPr>
+            <p:cNvCxnSpPr>
+              <a:cxnSpLocks/>
+            </p:cNvCxnSpPr>
+            <p:nvPr/>
+          </p:nvCxnSpPr>
+          <p:spPr>
+            <a:xfrm flipV="1">
+              <a:off x="6110781" y="1493209"/>
+              <a:ext cx="291788" cy="396259"/>
+            </a:xfrm>
+            <a:prstGeom prst="line">
+              <a:avLst/>
+            </a:prstGeom>
+            <a:noFill/>
+            <a:ln w="19050">
+              <a:solidFill>
+                <a:schemeClr val="bg1">
+                  <a:lumMod val="65000"/>
+                </a:schemeClr>
+              </a:solidFill>
+              <a:prstDash val="dash"/>
+            </a:ln>
+          </p:spPr>
+          <p:style>
+            <a:lnRef idx="2">
+              <a:schemeClr val="accent1">
+                <a:shade val="50000"/>
+              </a:schemeClr>
+            </a:lnRef>
+            <a:fillRef idx="1">
+              <a:schemeClr val="accent1"/>
+            </a:fillRef>
+            <a:effectRef idx="0">
+              <a:schemeClr val="accent1"/>
+            </a:effectRef>
+            <a:fontRef idx="minor">
+              <a:schemeClr val="lt1"/>
+            </a:fontRef>
+          </p:style>
+        </p:cxnSp>
+        <p:cxnSp>
+          <p:nvCxnSpPr>
+            <p:cNvPr id="123" name="직선 연결선 122">
+              <a:extLst>
+                <a:ext uri="{FF2B5EF4-FFF2-40B4-BE49-F238E27FC236}">
+                  <a16:creationId xmlns:a16="http://schemas.microsoft.com/office/drawing/2014/main" id="{0CB30C94-10CA-4613-8EFC-6900F7130E39}"/>
+                </a:ext>
+              </a:extLst>
+            </p:cNvPr>
+            <p:cNvCxnSpPr>
+              <a:cxnSpLocks/>
+            </p:cNvCxnSpPr>
+            <p:nvPr/>
+          </p:nvCxnSpPr>
+          <p:spPr>
+            <a:xfrm>
+              <a:off x="6109776" y="2170578"/>
+              <a:ext cx="295357" cy="427621"/>
+            </a:xfrm>
+            <a:prstGeom prst="line">
+              <a:avLst/>
+            </a:prstGeom>
+            <a:noFill/>
+            <a:ln w="19050">
+              <a:solidFill>
+                <a:schemeClr val="bg1">
+                  <a:lumMod val="65000"/>
+                </a:schemeClr>
+              </a:solidFill>
+              <a:prstDash val="dash"/>
+            </a:ln>
+          </p:spPr>
+          <p:style>
+            <a:lnRef idx="2">
+              <a:schemeClr val="accent1">
+                <a:shade val="50000"/>
+              </a:schemeClr>
+            </a:lnRef>
+            <a:fillRef idx="1">
+              <a:schemeClr val="accent1"/>
+            </a:fillRef>
+            <a:effectRef idx="0">
+              <a:schemeClr val="accent1"/>
+            </a:effectRef>
+            <a:fontRef idx="minor">
+              <a:schemeClr val="lt1"/>
+            </a:fontRef>
+          </p:style>
+        </p:cxnSp>
+        <p:sp>
+          <p:nvSpPr>
+            <p:cNvPr id="121" name="직사각형 120">
+              <a:extLst>
+                <a:ext uri="{FF2B5EF4-FFF2-40B4-BE49-F238E27FC236}">
+                  <a16:creationId xmlns:a16="http://schemas.microsoft.com/office/drawing/2014/main" id="{BB4ECDC4-D8D0-43ED-B837-2A7D93BEBA6A}"/>
+                </a:ext>
+              </a:extLst>
+            </p:cNvPr>
+            <p:cNvSpPr/>
+            <p:nvPr/>
+          </p:nvSpPr>
+          <p:spPr>
+            <a:xfrm>
+              <a:off x="6405134" y="1485810"/>
+              <a:ext cx="1958704" cy="1104990"/>
+            </a:xfrm>
+            <a:prstGeom prst="rect">
+              <a:avLst/>
+            </a:prstGeom>
+            <a:noFill/>
+            <a:ln w="19050">
+              <a:solidFill>
+                <a:schemeClr val="bg1">
+                  <a:lumMod val="65000"/>
+                </a:schemeClr>
+              </a:solidFill>
+              <a:prstDash val="dash"/>
+            </a:ln>
+          </p:spPr>
+          <p:style>
+            <a:lnRef idx="2">
+              <a:schemeClr val="accent1">
+                <a:shade val="50000"/>
+              </a:schemeClr>
+            </a:lnRef>
+            <a:fillRef idx="1">
+              <a:schemeClr val="accent1"/>
+            </a:fillRef>
+            <a:effectRef idx="0">
+              <a:schemeClr val="accent1"/>
+            </a:effectRef>
+            <a:fontRef idx="minor">
+              <a:schemeClr val="lt1"/>
+            </a:fontRef>
+          </p:style>
+          <p:txBody>
+            <a:bodyPr rtlCol="0" anchor="ctr"/>
+            <a:lstStyle/>
+            <a:p>
+              <a:pPr algn="ctr"/>
+              <a:r>
+                <a:rPr lang="en-US" altLang="ko-KR" dirty="0">
+                  <a:latin typeface="맑은 고딕" panose="020B0503020000020004" pitchFamily="50" charset="-127"/>
+                  <a:ea typeface="LG스마트체 Regular" panose="020B0600000101010101"/>
+                </a:rPr>
+                <a:t>`</a:t>
+              </a:r>
+              <a:endParaRPr lang="ko-KR" altLang="en-US" dirty="0">
                 <a:latin typeface="맑은 고딕" panose="020B0503020000020004" pitchFamily="50" charset="-127"/>
                 <a:ea typeface="LG스마트체 Regular" panose="020B0600000101010101"/>
-                <a:cs typeface="Arial" panose="020B0604020202020204" pitchFamily="34" charset="0"/>
-              </a:rPr>
-              <a:t>Feature Pyramid </a:t>
-            </a:r>
-          </a:p>
-          <a:p>
-            <a:pPr algn="ctr"/>
-            <a:r>
-              <a:rPr lang="en-US" altLang="ko-KR" sz="1000" dirty="0">
-                <a:latin typeface="맑은 고딕" panose="020B0503020000020004" pitchFamily="50" charset="-127"/>
-                <a:ea typeface="LG스마트체 Regular" panose="020B0600000101010101"/>
-                <a:cs typeface="Arial" panose="020B0604020202020204" pitchFamily="34" charset="0"/>
-              </a:rPr>
-              <a:t>Network</a:t>
-            </a:r>
-            <a:endParaRPr lang="ko-KR" altLang="en-US" sz="1000" dirty="0">
-              <a:latin typeface="맑은 고딕" panose="020B0503020000020004" pitchFamily="50" charset="-127"/>
-              <a:ea typeface="LG스마트체 Regular" panose="020B0600000101010101"/>
-              <a:cs typeface="Arial" panose="020B0604020202020204" pitchFamily="34" charset="0"/>
-            </a:endParaRPr>
-          </a:p>
-        </p:txBody>
-      </p:sp>
-      <p:cxnSp>
-        <p:nvCxnSpPr>
-          <p:cNvPr id="122" name="직선 연결선 121">
-            <a:extLst>
-              <a:ext uri="{FF2B5EF4-FFF2-40B4-BE49-F238E27FC236}">
-                <a16:creationId xmlns:a16="http://schemas.microsoft.com/office/drawing/2014/main" id="{95A7932F-CD14-4047-A700-03C4B7C7F910}"/>
-              </a:ext>
-            </a:extLst>
-          </p:cNvPr>
-          <p:cNvCxnSpPr>
-            <a:cxnSpLocks/>
-          </p:cNvCxnSpPr>
-          <p:nvPr/>
-        </p:nvCxnSpPr>
-        <p:spPr>
-          <a:xfrm flipV="1">
-            <a:off x="6110781" y="1653465"/>
-            <a:ext cx="395953" cy="236001"/>
-          </a:xfrm>
-          <a:prstGeom prst="line">
-            <a:avLst/>
-          </a:prstGeom>
-          <a:noFill/>
-          <a:ln w="19050">
-            <a:solidFill>
-              <a:schemeClr val="bg1">
-                <a:lumMod val="65000"/>
+              </a:endParaRPr>
+            </a:p>
+          </p:txBody>
+        </p:sp>
+        <p:sp>
+          <p:nvSpPr>
+            <p:cNvPr id="89" name="직사각형 88">
+              <a:extLst>
+                <a:ext uri="{FF2B5EF4-FFF2-40B4-BE49-F238E27FC236}">
+                  <a16:creationId xmlns:a16="http://schemas.microsoft.com/office/drawing/2014/main" id="{911FC5B3-8B27-4C88-A967-03D63464BBD8}"/>
+                </a:ext>
+              </a:extLst>
+            </p:cNvPr>
+            <p:cNvSpPr/>
+            <p:nvPr/>
+          </p:nvSpPr>
+          <p:spPr>
+            <a:xfrm>
+              <a:off x="6488720" y="1653465"/>
+              <a:ext cx="1474178" cy="252000"/>
+            </a:xfrm>
+            <a:prstGeom prst="rect">
+              <a:avLst/>
+            </a:prstGeom>
+            <a:noFill/>
+            <a:ln w="28575">
+              <a:solidFill>
+                <a:srgbClr val="00B0F0"/>
+              </a:solidFill>
+            </a:ln>
+          </p:spPr>
+          <p:style>
+            <a:lnRef idx="2">
+              <a:schemeClr val="accent1">
+                <a:shade val="50000"/>
               </a:schemeClr>
-            </a:solidFill>
-            <a:prstDash val="dash"/>
-          </a:ln>
-        </p:spPr>
-        <p:style>
-          <a:lnRef idx="2">
-            <a:schemeClr val="accent1">
-              <a:shade val="50000"/>
-            </a:schemeClr>
-          </a:lnRef>
-          <a:fillRef idx="1">
-            <a:schemeClr val="accent1"/>
-          </a:fillRef>
-          <a:effectRef idx="0">
-            <a:schemeClr val="accent1"/>
-          </a:effectRef>
-          <a:fontRef idx="minor">
-            <a:schemeClr val="lt1"/>
-          </a:fontRef>
-        </p:style>
-      </p:cxnSp>
-      <p:cxnSp>
-        <p:nvCxnSpPr>
-          <p:cNvPr id="123" name="직선 연결선 122">
-            <a:extLst>
-              <a:ext uri="{FF2B5EF4-FFF2-40B4-BE49-F238E27FC236}">
-                <a16:creationId xmlns:a16="http://schemas.microsoft.com/office/drawing/2014/main" id="{0CB30C94-10CA-4613-8EFC-6900F7130E39}"/>
-              </a:ext>
-            </a:extLst>
-          </p:cNvPr>
-          <p:cNvCxnSpPr>
-            <a:cxnSpLocks/>
-          </p:cNvCxnSpPr>
-          <p:nvPr/>
-        </p:nvCxnSpPr>
-        <p:spPr>
-          <a:xfrm>
-            <a:off x="6109776" y="2170578"/>
-            <a:ext cx="394393" cy="245451"/>
-          </a:xfrm>
-          <a:prstGeom prst="line">
-            <a:avLst/>
-          </a:prstGeom>
-          <a:noFill/>
-          <a:ln w="19050">
-            <a:solidFill>
-              <a:schemeClr val="bg1">
-                <a:lumMod val="65000"/>
+            </a:lnRef>
+            <a:fillRef idx="1">
+              <a:schemeClr val="accent1"/>
+            </a:fillRef>
+            <a:effectRef idx="0">
+              <a:schemeClr val="accent1"/>
+            </a:effectRef>
+            <a:fontRef idx="minor">
+              <a:schemeClr val="lt1"/>
+            </a:fontRef>
+          </p:style>
+          <p:txBody>
+            <a:bodyPr wrap="none" rtlCol="0" anchor="ctr"/>
+            <a:lstStyle/>
+            <a:p>
+              <a:pPr algn="ctr"/>
+              <a:r>
+                <a:rPr lang="en-US" altLang="ko-KR" sz="800" dirty="0">
+                  <a:solidFill>
+                    <a:sysClr val="windowText" lastClr="000000"/>
+                  </a:solidFill>
+                  <a:latin typeface="맑은 고딕" panose="020B0503020000020004" pitchFamily="50" charset="-127"/>
+                  <a:ea typeface="LG스마트체 Regular" panose="020B0600000101010101"/>
+                </a:rPr>
+                <a:t>Bounding Box (XYWH)</a:t>
+              </a:r>
+            </a:p>
+          </p:txBody>
+        </p:sp>
+        <p:sp>
+          <p:nvSpPr>
+            <p:cNvPr id="90" name="직사각형 89">
+              <a:extLst>
+                <a:ext uri="{FF2B5EF4-FFF2-40B4-BE49-F238E27FC236}">
+                  <a16:creationId xmlns:a16="http://schemas.microsoft.com/office/drawing/2014/main" id="{4A25ADF5-F6D0-4832-8C32-E9458C34645E}"/>
+                </a:ext>
+              </a:extLst>
+            </p:cNvPr>
+            <p:cNvSpPr/>
+            <p:nvPr/>
+          </p:nvSpPr>
+          <p:spPr>
+            <a:xfrm>
+              <a:off x="6488719" y="1912578"/>
+              <a:ext cx="1474180" cy="252000"/>
+            </a:xfrm>
+            <a:prstGeom prst="rect">
+              <a:avLst/>
+            </a:prstGeom>
+            <a:noFill/>
+            <a:ln w="28575">
+              <a:solidFill>
+                <a:srgbClr val="00B0F0"/>
+              </a:solidFill>
+            </a:ln>
+          </p:spPr>
+          <p:style>
+            <a:lnRef idx="2">
+              <a:schemeClr val="accent1">
+                <a:shade val="50000"/>
               </a:schemeClr>
-            </a:solidFill>
-            <a:prstDash val="dash"/>
-          </a:ln>
-        </p:spPr>
-        <p:style>
-          <a:lnRef idx="2">
-            <a:schemeClr val="accent1">
-              <a:shade val="50000"/>
-            </a:schemeClr>
-          </a:lnRef>
-          <a:fillRef idx="1">
-            <a:schemeClr val="accent1"/>
-          </a:fillRef>
-          <a:effectRef idx="0">
-            <a:schemeClr val="accent1"/>
-          </a:effectRef>
-          <a:fontRef idx="minor">
-            <a:schemeClr val="lt1"/>
-          </a:fontRef>
-        </p:style>
-      </p:cxnSp>
-      <p:sp>
-        <p:nvSpPr>
-          <p:cNvPr id="121" name="직사각형 120">
-            <a:extLst>
-              <a:ext uri="{FF2B5EF4-FFF2-40B4-BE49-F238E27FC236}">
-                <a16:creationId xmlns:a16="http://schemas.microsoft.com/office/drawing/2014/main" id="{BB4ECDC4-D8D0-43ED-B837-2A7D93BEBA6A}"/>
-              </a:ext>
-            </a:extLst>
-          </p:cNvPr>
-          <p:cNvSpPr/>
-          <p:nvPr/>
-        </p:nvSpPr>
-        <p:spPr>
-          <a:xfrm>
-            <a:off x="6506734" y="1660581"/>
-            <a:ext cx="2497566" cy="755448"/>
-          </a:xfrm>
-          <a:prstGeom prst="rect">
-            <a:avLst/>
-          </a:prstGeom>
-          <a:noFill/>
-          <a:ln w="19050">
-            <a:solidFill>
-              <a:schemeClr val="bg1">
-                <a:lumMod val="65000"/>
+            </a:lnRef>
+            <a:fillRef idx="1">
+              <a:schemeClr val="accent1"/>
+            </a:fillRef>
+            <a:effectRef idx="0">
+              <a:schemeClr val="accent1"/>
+            </a:effectRef>
+            <a:fontRef idx="minor">
+              <a:schemeClr val="lt1"/>
+            </a:fontRef>
+          </p:style>
+          <p:txBody>
+            <a:bodyPr wrap="none" rtlCol="0" anchor="ctr"/>
+            <a:lstStyle/>
+            <a:p>
+              <a:pPr algn="ctr"/>
+              <a:r>
+                <a:rPr lang="en-US" altLang="ko-KR" sz="800" dirty="0" err="1">
+                  <a:solidFill>
+                    <a:sysClr val="windowText" lastClr="000000"/>
+                  </a:solidFill>
+                  <a:latin typeface="맑은 고딕" panose="020B0503020000020004" pitchFamily="50" charset="-127"/>
+                  <a:ea typeface="LG스마트체 Regular" panose="020B0600000101010101"/>
+                </a:rPr>
+                <a:t>Objectness</a:t>
+              </a:r>
+              <a:r>
+                <a:rPr lang="en-US" altLang="ko-KR" sz="800" dirty="0">
+                  <a:solidFill>
+                    <a:sysClr val="windowText" lastClr="000000"/>
+                  </a:solidFill>
+                  <a:latin typeface="맑은 고딕" panose="020B0503020000020004" pitchFamily="50" charset="-127"/>
+                  <a:ea typeface="LG스마트체 Regular" panose="020B0600000101010101"/>
+                </a:rPr>
+                <a:t>(O)</a:t>
+              </a:r>
+            </a:p>
+          </p:txBody>
+        </p:sp>
+        <p:sp>
+          <p:nvSpPr>
+            <p:cNvPr id="91" name="직사각형 90">
+              <a:extLst>
+                <a:ext uri="{FF2B5EF4-FFF2-40B4-BE49-F238E27FC236}">
+                  <a16:creationId xmlns:a16="http://schemas.microsoft.com/office/drawing/2014/main" id="{E26D1450-32D3-48C2-90B6-766817361BFD}"/>
+                </a:ext>
+              </a:extLst>
+            </p:cNvPr>
+            <p:cNvSpPr/>
+            <p:nvPr/>
+          </p:nvSpPr>
+          <p:spPr>
+            <a:xfrm>
+              <a:off x="6488740" y="2163462"/>
+              <a:ext cx="1474158" cy="252000"/>
+            </a:xfrm>
+            <a:prstGeom prst="rect">
+              <a:avLst/>
+            </a:prstGeom>
+            <a:noFill/>
+            <a:ln w="28575">
+              <a:solidFill>
+                <a:srgbClr val="00B0F0"/>
+              </a:solidFill>
+            </a:ln>
+          </p:spPr>
+          <p:style>
+            <a:lnRef idx="2">
+              <a:schemeClr val="accent1">
+                <a:shade val="50000"/>
               </a:schemeClr>
-            </a:solidFill>
-            <a:prstDash val="dash"/>
-          </a:ln>
-        </p:spPr>
-        <p:style>
-          <a:lnRef idx="2">
-            <a:schemeClr val="accent1">
-              <a:shade val="50000"/>
-            </a:schemeClr>
-          </a:lnRef>
-          <a:fillRef idx="1">
-            <a:schemeClr val="accent1"/>
-          </a:fillRef>
-          <a:effectRef idx="0">
-            <a:schemeClr val="accent1"/>
-          </a:effectRef>
-          <a:fontRef idx="minor">
-            <a:schemeClr val="lt1"/>
-          </a:fontRef>
-        </p:style>
-        <p:txBody>
-          <a:bodyPr rtlCol="0" anchor="ctr"/>
-          <a:lstStyle/>
-          <a:p>
-            <a:pPr algn="ctr"/>
-            <a:r>
-              <a:rPr lang="en-US" altLang="ko-KR" dirty="0">
-                <a:latin typeface="맑은 고딕" panose="020B0503020000020004" pitchFamily="50" charset="-127"/>
-                <a:ea typeface="LG스마트체 Regular" panose="020B0600000101010101"/>
-              </a:rPr>
-              <a:t>`</a:t>
-            </a:r>
-            <a:endParaRPr lang="ko-KR" altLang="en-US" dirty="0">
-              <a:latin typeface="맑은 고딕" panose="020B0503020000020004" pitchFamily="50" charset="-127"/>
-              <a:ea typeface="LG스마트체 Regular" panose="020B0600000101010101"/>
-            </a:endParaRPr>
-          </a:p>
-        </p:txBody>
-      </p:sp>
-      <p:sp>
-        <p:nvSpPr>
-          <p:cNvPr id="89" name="직사각형 88">
-            <a:extLst>
-              <a:ext uri="{FF2B5EF4-FFF2-40B4-BE49-F238E27FC236}">
-                <a16:creationId xmlns:a16="http://schemas.microsoft.com/office/drawing/2014/main" id="{911FC5B3-8B27-4C88-A967-03D63464BBD8}"/>
-              </a:ext>
-            </a:extLst>
-          </p:cNvPr>
-          <p:cNvSpPr/>
-          <p:nvPr/>
-        </p:nvSpPr>
-        <p:spPr>
-          <a:xfrm>
-            <a:off x="6552220" y="1985145"/>
-            <a:ext cx="706425" cy="324000"/>
-          </a:xfrm>
-          <a:prstGeom prst="rect">
-            <a:avLst/>
-          </a:prstGeom>
-          <a:noFill/>
-          <a:ln w="28575">
-            <a:solidFill>
-              <a:srgbClr val="00B0F0"/>
-            </a:solidFill>
-          </a:ln>
-        </p:spPr>
-        <p:style>
-          <a:lnRef idx="2">
-            <a:schemeClr val="accent1">
-              <a:shade val="50000"/>
-            </a:schemeClr>
-          </a:lnRef>
-          <a:fillRef idx="1">
-            <a:schemeClr val="accent1"/>
-          </a:fillRef>
-          <a:effectRef idx="0">
-            <a:schemeClr val="accent1"/>
-          </a:effectRef>
-          <a:fontRef idx="minor">
-            <a:schemeClr val="lt1"/>
-          </a:fontRef>
-        </p:style>
-        <p:txBody>
-          <a:bodyPr wrap="none" rtlCol="0" anchor="ctr"/>
-          <a:lstStyle/>
-          <a:p>
-            <a:pPr algn="ctr"/>
-            <a:r>
-              <a:rPr lang="en-US" altLang="ko-KR" sz="800" dirty="0" err="1">
-                <a:solidFill>
-                  <a:sysClr val="windowText" lastClr="000000"/>
-                </a:solidFill>
-                <a:latin typeface="맑은 고딕" panose="020B0503020000020004" pitchFamily="50" charset="-127"/>
-                <a:ea typeface="LG스마트체 Regular" panose="020B0600000101010101"/>
-              </a:rPr>
-              <a:t>Objectness</a:t>
-            </a:r>
-            <a:endParaRPr lang="en-US" altLang="ko-KR" sz="800" dirty="0">
-              <a:solidFill>
-                <a:sysClr val="windowText" lastClr="000000"/>
-              </a:solidFill>
-              <a:latin typeface="맑은 고딕" panose="020B0503020000020004" pitchFamily="50" charset="-127"/>
-              <a:ea typeface="LG스마트체 Regular" panose="020B0600000101010101"/>
-            </a:endParaRPr>
-          </a:p>
-          <a:p>
-            <a:pPr algn="ctr"/>
-            <a:r>
-              <a:rPr lang="en-US" altLang="ko-KR" sz="800" dirty="0">
-                <a:solidFill>
-                  <a:sysClr val="windowText" lastClr="000000"/>
-                </a:solidFill>
-                <a:latin typeface="맑은 고딕" panose="020B0503020000020004" pitchFamily="50" charset="-127"/>
-                <a:ea typeface="LG스마트체 Regular" panose="020B0600000101010101"/>
-              </a:rPr>
-              <a:t>(O)</a:t>
-            </a:r>
-          </a:p>
-        </p:txBody>
-      </p:sp>
-      <p:sp>
-        <p:nvSpPr>
-          <p:cNvPr id="90" name="직사각형 89">
-            <a:extLst>
-              <a:ext uri="{FF2B5EF4-FFF2-40B4-BE49-F238E27FC236}">
-                <a16:creationId xmlns:a16="http://schemas.microsoft.com/office/drawing/2014/main" id="{4A25ADF5-F6D0-4832-8C32-E9458C34645E}"/>
-              </a:ext>
-            </a:extLst>
-          </p:cNvPr>
-          <p:cNvSpPr/>
-          <p:nvPr/>
-        </p:nvSpPr>
-        <p:spPr>
-          <a:xfrm>
-            <a:off x="7258645" y="1985145"/>
-            <a:ext cx="706425" cy="324000"/>
-          </a:xfrm>
-          <a:prstGeom prst="rect">
-            <a:avLst/>
-          </a:prstGeom>
-          <a:noFill/>
-          <a:ln w="28575">
-            <a:solidFill>
-              <a:srgbClr val="00B0F0"/>
-            </a:solidFill>
-          </a:ln>
-        </p:spPr>
-        <p:style>
-          <a:lnRef idx="2">
-            <a:schemeClr val="accent1">
-              <a:shade val="50000"/>
-            </a:schemeClr>
-          </a:lnRef>
-          <a:fillRef idx="1">
-            <a:schemeClr val="accent1"/>
-          </a:fillRef>
-          <a:effectRef idx="0">
-            <a:schemeClr val="accent1"/>
-          </a:effectRef>
-          <a:fontRef idx="minor">
-            <a:schemeClr val="lt1"/>
-          </a:fontRef>
-        </p:style>
-        <p:txBody>
-          <a:bodyPr wrap="none" rtlCol="0" anchor="ctr"/>
-          <a:lstStyle/>
-          <a:p>
-            <a:pPr algn="ctr"/>
-            <a:r>
-              <a:rPr lang="en-US" altLang="ko-KR" sz="800" dirty="0">
-                <a:solidFill>
-                  <a:sysClr val="windowText" lastClr="000000"/>
-                </a:solidFill>
-                <a:latin typeface="맑은 고딕" panose="020B0503020000020004" pitchFamily="50" charset="-127"/>
-                <a:ea typeface="LG스마트체 Regular" panose="020B0600000101010101"/>
-              </a:rPr>
-              <a:t>Bounding Box</a:t>
-            </a:r>
-          </a:p>
-          <a:p>
-            <a:pPr algn="ctr"/>
-            <a:r>
-              <a:rPr lang="en-US" altLang="ko-KR" sz="800" dirty="0">
-                <a:solidFill>
-                  <a:sysClr val="windowText" lastClr="000000"/>
-                </a:solidFill>
-                <a:latin typeface="맑은 고딕" panose="020B0503020000020004" pitchFamily="50" charset="-127"/>
-                <a:ea typeface="LG스마트체 Regular" panose="020B0600000101010101"/>
-              </a:rPr>
-              <a:t>(XYWH)</a:t>
-            </a:r>
-          </a:p>
-        </p:txBody>
-      </p:sp>
-      <p:sp>
-        <p:nvSpPr>
-          <p:cNvPr id="91" name="직사각형 90">
-            <a:extLst>
-              <a:ext uri="{FF2B5EF4-FFF2-40B4-BE49-F238E27FC236}">
-                <a16:creationId xmlns:a16="http://schemas.microsoft.com/office/drawing/2014/main" id="{E26D1450-32D3-48C2-90B6-766817361BFD}"/>
-              </a:ext>
-            </a:extLst>
-          </p:cNvPr>
-          <p:cNvSpPr/>
-          <p:nvPr/>
-        </p:nvSpPr>
-        <p:spPr>
-          <a:xfrm>
-            <a:off x="7965070" y="1985145"/>
-            <a:ext cx="900000" cy="324000"/>
-          </a:xfrm>
-          <a:prstGeom prst="rect">
-            <a:avLst/>
-          </a:prstGeom>
-          <a:noFill/>
-          <a:ln w="28575">
-            <a:solidFill>
-              <a:srgbClr val="00B0F0"/>
-            </a:solidFill>
-          </a:ln>
-        </p:spPr>
-        <p:style>
-          <a:lnRef idx="2">
-            <a:schemeClr val="accent1">
-              <a:shade val="50000"/>
-            </a:schemeClr>
-          </a:lnRef>
-          <a:fillRef idx="1">
-            <a:schemeClr val="accent1"/>
-          </a:fillRef>
-          <a:effectRef idx="0">
-            <a:schemeClr val="accent1"/>
-          </a:effectRef>
-          <a:fontRef idx="minor">
-            <a:schemeClr val="lt1"/>
-          </a:fontRef>
-        </p:style>
-        <p:txBody>
-          <a:bodyPr wrap="none" rtlCol="0" anchor="ctr"/>
-          <a:lstStyle/>
-          <a:p>
-            <a:pPr algn="ctr"/>
-            <a:r>
-              <a:rPr lang="en-US" altLang="ko-KR" sz="800" dirty="0">
-                <a:solidFill>
-                  <a:sysClr val="windowText" lastClr="000000"/>
-                </a:solidFill>
-                <a:latin typeface="맑은 고딕" panose="020B0503020000020004" pitchFamily="50" charset="-127"/>
-                <a:ea typeface="LG스마트체 Regular" panose="020B0600000101010101"/>
-              </a:rPr>
-              <a:t>Class Probability</a:t>
-            </a:r>
-          </a:p>
-          <a:p>
-            <a:pPr algn="ctr"/>
-            <a:r>
-              <a:rPr lang="en-US" altLang="ko-KR" sz="800" dirty="0">
-                <a:solidFill>
-                  <a:sysClr val="windowText" lastClr="000000"/>
-                </a:solidFill>
-                <a:latin typeface="맑은 고딕" panose="020B0503020000020004" pitchFamily="50" charset="-127"/>
-                <a:ea typeface="LG스마트체 Regular" panose="020B0600000101010101"/>
-              </a:rPr>
-              <a:t>(P0,P1,…,PK)</a:t>
-            </a:r>
-          </a:p>
-        </p:txBody>
-      </p:sp>
-      <p:sp>
-        <p:nvSpPr>
-          <p:cNvPr id="7" name="TextBox 6">
-            <a:extLst>
-              <a:ext uri="{FF2B5EF4-FFF2-40B4-BE49-F238E27FC236}">
-                <a16:creationId xmlns:a16="http://schemas.microsoft.com/office/drawing/2014/main" id="{B51B8090-1A41-4DFB-8871-EBF7B4E8145C}"/>
-              </a:ext>
-            </a:extLst>
-          </p:cNvPr>
-          <p:cNvSpPr txBox="1"/>
-          <p:nvPr/>
-        </p:nvSpPr>
-        <p:spPr>
-          <a:xfrm>
-            <a:off x="7545363" y="1637903"/>
-            <a:ext cx="420308" cy="246221"/>
-          </a:xfrm>
-          <a:prstGeom prst="rect">
-            <a:avLst/>
-          </a:prstGeom>
-          <a:noFill/>
-        </p:spPr>
-        <p:txBody>
-          <a:bodyPr wrap="none" rtlCol="0">
-            <a:spAutoFit/>
-          </a:bodyPr>
-          <a:lstStyle/>
-          <a:p>
-            <a:r>
-              <a:rPr lang="en-US" altLang="ko-KR" sz="1000" dirty="0"/>
-              <a:t>5+K</a:t>
-            </a:r>
-            <a:endParaRPr lang="ko-KR" altLang="en-US" sz="1000" dirty="0"/>
-          </a:p>
-        </p:txBody>
-      </p:sp>
-      <p:cxnSp>
-        <p:nvCxnSpPr>
-          <p:cNvPr id="124" name="직선 연결선 123">
-            <a:extLst>
-              <a:ext uri="{FF2B5EF4-FFF2-40B4-BE49-F238E27FC236}">
-                <a16:creationId xmlns:a16="http://schemas.microsoft.com/office/drawing/2014/main" id="{A76D3F67-03AE-400C-AA2A-BC74E2DEF4D4}"/>
-              </a:ext>
-            </a:extLst>
-          </p:cNvPr>
-          <p:cNvCxnSpPr/>
-          <p:nvPr/>
-        </p:nvCxnSpPr>
-        <p:spPr>
-          <a:xfrm>
-            <a:off x="8951599" y="1909813"/>
-            <a:ext cx="0" cy="324000"/>
-          </a:xfrm>
-          <a:prstGeom prst="line">
-            <a:avLst/>
-          </a:prstGeom>
-          <a:ln w="28575">
-            <a:solidFill>
-              <a:srgbClr val="00B0F0"/>
-            </a:solidFill>
-          </a:ln>
-        </p:spPr>
-        <p:style>
-          <a:lnRef idx="1">
-            <a:schemeClr val="accent1"/>
-          </a:lnRef>
-          <a:fillRef idx="0">
-            <a:schemeClr val="accent1"/>
-          </a:fillRef>
-          <a:effectRef idx="0">
-            <a:schemeClr val="accent1"/>
-          </a:effectRef>
-          <a:fontRef idx="minor">
-            <a:schemeClr val="tx1"/>
-          </a:fontRef>
-        </p:style>
-      </p:cxnSp>
-      <p:cxnSp>
-        <p:nvCxnSpPr>
-          <p:cNvPr id="182" name="직선 연결선 181">
-            <a:extLst>
-              <a:ext uri="{FF2B5EF4-FFF2-40B4-BE49-F238E27FC236}">
-                <a16:creationId xmlns:a16="http://schemas.microsoft.com/office/drawing/2014/main" id="{D084BDC3-94D8-4019-93CB-27AFCAFC67FC}"/>
-              </a:ext>
-            </a:extLst>
-          </p:cNvPr>
-          <p:cNvCxnSpPr>
-            <a:cxnSpLocks/>
-          </p:cNvCxnSpPr>
-          <p:nvPr/>
-        </p:nvCxnSpPr>
-        <p:spPr>
-          <a:xfrm flipH="1">
-            <a:off x="6620391" y="1889463"/>
-            <a:ext cx="2331208" cy="0"/>
-          </a:xfrm>
-          <a:prstGeom prst="line">
-            <a:avLst/>
-          </a:prstGeom>
-          <a:ln w="28575">
-            <a:solidFill>
-              <a:srgbClr val="00B0F0"/>
-            </a:solidFill>
-          </a:ln>
-        </p:spPr>
-        <p:style>
-          <a:lnRef idx="1">
-            <a:schemeClr val="accent1"/>
-          </a:lnRef>
-          <a:fillRef idx="0">
-            <a:schemeClr val="accent1"/>
-          </a:fillRef>
-          <a:effectRef idx="0">
-            <a:schemeClr val="accent1"/>
-          </a:effectRef>
-          <a:fontRef idx="minor">
-            <a:schemeClr val="tx1"/>
-          </a:fontRef>
-        </p:style>
-      </p:cxnSp>
-      <p:cxnSp>
-        <p:nvCxnSpPr>
-          <p:cNvPr id="184" name="직선 연결선 183">
-            <a:extLst>
-              <a:ext uri="{FF2B5EF4-FFF2-40B4-BE49-F238E27FC236}">
-                <a16:creationId xmlns:a16="http://schemas.microsoft.com/office/drawing/2014/main" id="{190F6CB8-DAE6-4FA2-AC2E-7F5CAFEB2F62}"/>
-              </a:ext>
-            </a:extLst>
-          </p:cNvPr>
-          <p:cNvCxnSpPr>
-            <a:cxnSpLocks/>
-          </p:cNvCxnSpPr>
-          <p:nvPr/>
-        </p:nvCxnSpPr>
-        <p:spPr>
-          <a:xfrm flipV="1">
-            <a:off x="8865070" y="1889463"/>
-            <a:ext cx="97799" cy="95682"/>
-          </a:xfrm>
-          <a:prstGeom prst="line">
-            <a:avLst/>
-          </a:prstGeom>
-          <a:ln w="28575">
-            <a:solidFill>
-              <a:srgbClr val="00B0F0"/>
-            </a:solidFill>
-          </a:ln>
-        </p:spPr>
-        <p:style>
-          <a:lnRef idx="1">
-            <a:schemeClr val="accent1"/>
-          </a:lnRef>
-          <a:fillRef idx="0">
-            <a:schemeClr val="accent1"/>
-          </a:fillRef>
-          <a:effectRef idx="0">
-            <a:schemeClr val="accent1"/>
-          </a:effectRef>
-          <a:fontRef idx="minor">
-            <a:schemeClr val="tx1"/>
-          </a:fontRef>
-        </p:style>
-      </p:cxnSp>
-      <p:cxnSp>
-        <p:nvCxnSpPr>
-          <p:cNvPr id="185" name="직선 연결선 184">
-            <a:extLst>
-              <a:ext uri="{FF2B5EF4-FFF2-40B4-BE49-F238E27FC236}">
-                <a16:creationId xmlns:a16="http://schemas.microsoft.com/office/drawing/2014/main" id="{C8E947AE-8781-4108-A947-210790ED1525}"/>
-              </a:ext>
-            </a:extLst>
-          </p:cNvPr>
-          <p:cNvCxnSpPr>
-            <a:cxnSpLocks/>
-          </p:cNvCxnSpPr>
-          <p:nvPr/>
-        </p:nvCxnSpPr>
-        <p:spPr>
-          <a:xfrm flipV="1">
-            <a:off x="8865070" y="2213463"/>
-            <a:ext cx="97799" cy="95682"/>
-          </a:xfrm>
-          <a:prstGeom prst="line">
-            <a:avLst/>
-          </a:prstGeom>
-          <a:ln w="28575">
-            <a:solidFill>
-              <a:srgbClr val="00B0F0"/>
-            </a:solidFill>
-          </a:ln>
-        </p:spPr>
-        <p:style>
-          <a:lnRef idx="1">
-            <a:schemeClr val="accent1"/>
-          </a:lnRef>
-          <a:fillRef idx="0">
-            <a:schemeClr val="accent1"/>
-          </a:fillRef>
-          <a:effectRef idx="0">
-            <a:schemeClr val="accent1"/>
-          </a:effectRef>
-          <a:fontRef idx="minor">
-            <a:schemeClr val="tx1"/>
-          </a:fontRef>
-        </p:style>
-      </p:cxnSp>
-      <p:cxnSp>
-        <p:nvCxnSpPr>
-          <p:cNvPr id="186" name="직선 연결선 185">
-            <a:extLst>
-              <a:ext uri="{FF2B5EF4-FFF2-40B4-BE49-F238E27FC236}">
-                <a16:creationId xmlns:a16="http://schemas.microsoft.com/office/drawing/2014/main" id="{032BD7E1-A0AB-4259-BC8A-46E6892F6832}"/>
-              </a:ext>
-            </a:extLst>
-          </p:cNvPr>
-          <p:cNvCxnSpPr>
-            <a:cxnSpLocks/>
-          </p:cNvCxnSpPr>
-          <p:nvPr/>
-        </p:nvCxnSpPr>
-        <p:spPr>
-          <a:xfrm flipV="1">
-            <a:off x="6540951" y="1885905"/>
-            <a:ext cx="97799" cy="95682"/>
-          </a:xfrm>
-          <a:prstGeom prst="line">
-            <a:avLst/>
-          </a:prstGeom>
-          <a:ln w="28575">
-            <a:solidFill>
-              <a:srgbClr val="00B0F0"/>
-            </a:solidFill>
-          </a:ln>
-        </p:spPr>
-        <p:style>
-          <a:lnRef idx="1">
-            <a:schemeClr val="accent1"/>
-          </a:lnRef>
-          <a:fillRef idx="0">
-            <a:schemeClr val="accent1"/>
-          </a:fillRef>
-          <a:effectRef idx="0">
-            <a:schemeClr val="accent1"/>
-          </a:effectRef>
-          <a:fontRef idx="minor">
-            <a:schemeClr val="tx1"/>
-          </a:fontRef>
-        </p:style>
-      </p:cxnSp>
-      <p:cxnSp>
-        <p:nvCxnSpPr>
-          <p:cNvPr id="3" name="직선 화살표 연결선 2">
-            <a:extLst>
-              <a:ext uri="{FF2B5EF4-FFF2-40B4-BE49-F238E27FC236}">
-                <a16:creationId xmlns:a16="http://schemas.microsoft.com/office/drawing/2014/main" id="{E5026587-FBC8-4484-B2C0-250FB5736D45}"/>
-              </a:ext>
-            </a:extLst>
-          </p:cNvPr>
-          <p:cNvCxnSpPr>
-            <a:cxnSpLocks/>
-          </p:cNvCxnSpPr>
-          <p:nvPr/>
-        </p:nvCxnSpPr>
-        <p:spPr>
-          <a:xfrm>
-            <a:off x="6552220" y="1925993"/>
-            <a:ext cx="2312850" cy="0"/>
-          </a:xfrm>
-          <a:prstGeom prst="straightConnector1">
-            <a:avLst/>
-          </a:prstGeom>
-          <a:ln>
-            <a:headEnd type="triangle"/>
-            <a:tailEnd type="triangle"/>
-          </a:ln>
-        </p:spPr>
-        <p:style>
-          <a:lnRef idx="1">
-            <a:schemeClr val="accent1"/>
-          </a:lnRef>
-          <a:fillRef idx="0">
-            <a:schemeClr val="accent1"/>
-          </a:fillRef>
-          <a:effectRef idx="0">
-            <a:schemeClr val="accent1"/>
-          </a:effectRef>
-          <a:fontRef idx="minor">
-            <a:schemeClr val="tx1"/>
-          </a:fontRef>
-        </p:style>
-      </p:cxnSp>
+            </a:lnRef>
+            <a:fillRef idx="1">
+              <a:schemeClr val="accent1"/>
+            </a:fillRef>
+            <a:effectRef idx="0">
+              <a:schemeClr val="accent1"/>
+            </a:effectRef>
+            <a:fontRef idx="minor">
+              <a:schemeClr val="lt1"/>
+            </a:fontRef>
+          </p:style>
+          <p:txBody>
+            <a:bodyPr wrap="none" rtlCol="0" anchor="ctr"/>
+            <a:lstStyle/>
+            <a:p>
+              <a:pPr algn="ctr"/>
+              <a:r>
+                <a:rPr lang="en-US" altLang="ko-KR" sz="800" dirty="0">
+                  <a:solidFill>
+                    <a:sysClr val="windowText" lastClr="000000"/>
+                  </a:solidFill>
+                  <a:latin typeface="맑은 고딕" panose="020B0503020000020004" pitchFamily="50" charset="-127"/>
+                  <a:ea typeface="LG스마트체 Regular" panose="020B0600000101010101"/>
+                </a:rPr>
+                <a:t>Class Probability (P0,P1,…,PK)</a:t>
+              </a:r>
+            </a:p>
+          </p:txBody>
+        </p:sp>
+        <p:sp>
+          <p:nvSpPr>
+            <p:cNvPr id="7" name="TextBox 6">
+              <a:extLst>
+                <a:ext uri="{FF2B5EF4-FFF2-40B4-BE49-F238E27FC236}">
+                  <a16:creationId xmlns:a16="http://schemas.microsoft.com/office/drawing/2014/main" id="{B51B8090-1A41-4DFB-8871-EBF7B4E8145C}"/>
+                </a:ext>
+              </a:extLst>
+            </p:cNvPr>
+            <p:cNvSpPr txBox="1"/>
+            <p:nvPr/>
+          </p:nvSpPr>
+          <p:spPr>
+            <a:xfrm>
+              <a:off x="7970454" y="1902133"/>
+              <a:ext cx="420308" cy="246221"/>
+            </a:xfrm>
+            <a:prstGeom prst="rect">
+              <a:avLst/>
+            </a:prstGeom>
+            <a:noFill/>
+          </p:spPr>
+          <p:txBody>
+            <a:bodyPr wrap="none" rtlCol="0">
+              <a:spAutoFit/>
+            </a:bodyPr>
+            <a:lstStyle/>
+            <a:p>
+              <a:r>
+                <a:rPr lang="en-US" altLang="ko-KR" sz="1000" dirty="0"/>
+                <a:t>5+K</a:t>
+              </a:r>
+              <a:endParaRPr lang="ko-KR" altLang="en-US" sz="1000" dirty="0"/>
+            </a:p>
+          </p:txBody>
+        </p:sp>
+        <p:cxnSp>
+          <p:nvCxnSpPr>
+            <p:cNvPr id="3" name="직선 화살표 연결선 2">
+              <a:extLst>
+                <a:ext uri="{FF2B5EF4-FFF2-40B4-BE49-F238E27FC236}">
+                  <a16:creationId xmlns:a16="http://schemas.microsoft.com/office/drawing/2014/main" id="{E5026587-FBC8-4484-B2C0-250FB5736D45}"/>
+                </a:ext>
+              </a:extLst>
+            </p:cNvPr>
+            <p:cNvCxnSpPr>
+              <a:cxnSpLocks/>
+            </p:cNvCxnSpPr>
+            <p:nvPr/>
+          </p:nvCxnSpPr>
+          <p:spPr>
+            <a:xfrm flipH="1" flipV="1">
+              <a:off x="8033955" y="1649907"/>
+              <a:ext cx="1" cy="778255"/>
+            </a:xfrm>
+            <a:prstGeom prst="straightConnector1">
+              <a:avLst/>
+            </a:prstGeom>
+            <a:ln>
+              <a:headEnd type="triangle"/>
+              <a:tailEnd type="triangle"/>
+            </a:ln>
+          </p:spPr>
+          <p:style>
+            <a:lnRef idx="1">
+              <a:schemeClr val="accent1"/>
+            </a:lnRef>
+            <a:fillRef idx="0">
+              <a:schemeClr val="accent1"/>
+            </a:fillRef>
+            <a:effectRef idx="0">
+              <a:schemeClr val="accent1"/>
+            </a:effectRef>
+            <a:fontRef idx="minor">
+              <a:schemeClr val="tx1"/>
+            </a:fontRef>
+          </p:style>
+        </p:cxnSp>
+      </p:grpSp>
     </p:spTree>
     <p:extLst>
       <p:ext uri="{BB962C8B-B14F-4D97-AF65-F5344CB8AC3E}">

</xml_diff>

<commit_message>
(dt) update figures in classifier
</commit_message>
<xml_diff>
--- a/assets/detector/figures.pptx
+++ b/assets/detector/figures.pptx
@@ -263,7 +263,7 @@
           <a:p>
             <a:fld id="{B14EE84C-1BA9-492D-BEBF-4AB0B5FCE851}" type="datetimeFigureOut">
               <a:rPr lang="ko-KR" altLang="en-US" smtClean="0"/>
-              <a:t>2021-03-03</a:t>
+              <a:t>2021-03-04</a:t>
             </a:fld>
             <a:endParaRPr lang="ko-KR" altLang="en-US"/>
           </a:p>
@@ -461,7 +461,7 @@
           <a:p>
             <a:fld id="{B14EE84C-1BA9-492D-BEBF-4AB0B5FCE851}" type="datetimeFigureOut">
               <a:rPr lang="ko-KR" altLang="en-US" smtClean="0"/>
-              <a:t>2021-03-03</a:t>
+              <a:t>2021-03-04</a:t>
             </a:fld>
             <a:endParaRPr lang="ko-KR" altLang="en-US"/>
           </a:p>
@@ -669,7 +669,7 @@
           <a:p>
             <a:fld id="{B14EE84C-1BA9-492D-BEBF-4AB0B5FCE851}" type="datetimeFigureOut">
               <a:rPr lang="ko-KR" altLang="en-US" smtClean="0"/>
-              <a:t>2021-03-03</a:t>
+              <a:t>2021-03-04</a:t>
             </a:fld>
             <a:endParaRPr lang="ko-KR" altLang="en-US"/>
           </a:p>
@@ -867,7 +867,7 @@
           <a:p>
             <a:fld id="{B14EE84C-1BA9-492D-BEBF-4AB0B5FCE851}" type="datetimeFigureOut">
               <a:rPr lang="ko-KR" altLang="en-US" smtClean="0"/>
-              <a:t>2021-03-03</a:t>
+              <a:t>2021-03-04</a:t>
             </a:fld>
             <a:endParaRPr lang="ko-KR" altLang="en-US"/>
           </a:p>
@@ -1142,7 +1142,7 @@
           <a:p>
             <a:fld id="{B14EE84C-1BA9-492D-BEBF-4AB0B5FCE851}" type="datetimeFigureOut">
               <a:rPr lang="ko-KR" altLang="en-US" smtClean="0"/>
-              <a:t>2021-03-03</a:t>
+              <a:t>2021-03-04</a:t>
             </a:fld>
             <a:endParaRPr lang="ko-KR" altLang="en-US"/>
           </a:p>
@@ -1407,7 +1407,7 @@
           <a:p>
             <a:fld id="{B14EE84C-1BA9-492D-BEBF-4AB0B5FCE851}" type="datetimeFigureOut">
               <a:rPr lang="ko-KR" altLang="en-US" smtClean="0"/>
-              <a:t>2021-03-03</a:t>
+              <a:t>2021-03-04</a:t>
             </a:fld>
             <a:endParaRPr lang="ko-KR" altLang="en-US"/>
           </a:p>
@@ -1819,7 +1819,7 @@
           <a:p>
             <a:fld id="{B14EE84C-1BA9-492D-BEBF-4AB0B5FCE851}" type="datetimeFigureOut">
               <a:rPr lang="ko-KR" altLang="en-US" smtClean="0"/>
-              <a:t>2021-03-03</a:t>
+              <a:t>2021-03-04</a:t>
             </a:fld>
             <a:endParaRPr lang="ko-KR" altLang="en-US"/>
           </a:p>
@@ -1960,7 +1960,7 @@
           <a:p>
             <a:fld id="{B14EE84C-1BA9-492D-BEBF-4AB0B5FCE851}" type="datetimeFigureOut">
               <a:rPr lang="ko-KR" altLang="en-US" smtClean="0"/>
-              <a:t>2021-03-03</a:t>
+              <a:t>2021-03-04</a:t>
             </a:fld>
             <a:endParaRPr lang="ko-KR" altLang="en-US"/>
           </a:p>
@@ -2073,7 +2073,7 @@
           <a:p>
             <a:fld id="{B14EE84C-1BA9-492D-BEBF-4AB0B5FCE851}" type="datetimeFigureOut">
               <a:rPr lang="ko-KR" altLang="en-US" smtClean="0"/>
-              <a:t>2021-03-03</a:t>
+              <a:t>2021-03-04</a:t>
             </a:fld>
             <a:endParaRPr lang="ko-KR" altLang="en-US"/>
           </a:p>
@@ -2384,7 +2384,7 @@
           <a:p>
             <a:fld id="{B14EE84C-1BA9-492D-BEBF-4AB0B5FCE851}" type="datetimeFigureOut">
               <a:rPr lang="ko-KR" altLang="en-US" smtClean="0"/>
-              <a:t>2021-03-03</a:t>
+              <a:t>2021-03-04</a:t>
             </a:fld>
             <a:endParaRPr lang="ko-KR" altLang="en-US"/>
           </a:p>
@@ -2672,7 +2672,7 @@
           <a:p>
             <a:fld id="{B14EE84C-1BA9-492D-BEBF-4AB0B5FCE851}" type="datetimeFigureOut">
               <a:rPr lang="ko-KR" altLang="en-US" smtClean="0"/>
-              <a:t>2021-03-03</a:t>
+              <a:t>2021-03-04</a:t>
             </a:fld>
             <a:endParaRPr lang="ko-KR" altLang="en-US"/>
           </a:p>
@@ -2913,7 +2913,7 @@
           <a:p>
             <a:fld id="{B14EE84C-1BA9-492D-BEBF-4AB0B5FCE851}" type="datetimeFigureOut">
               <a:rPr lang="ko-KR" altLang="en-US" smtClean="0"/>
-              <a:t>2021-03-03</a:t>
+              <a:t>2021-03-04</a:t>
             </a:fld>
             <a:endParaRPr lang="ko-KR" altLang="en-US"/>
           </a:p>
@@ -8037,7 +8037,7 @@
                   <a:latin typeface="맑은 고딕" panose="020B0503020000020004" pitchFamily="50" charset="-127"/>
                   <a:ea typeface="LG스마트체 Regular" panose="020B0600000101010101"/>
                 </a:rPr>
-                <a:t>Class Probability (P0,P1,…,PK)</a:t>
+                <a:t>Class Probability (P1,…,PK)</a:t>
               </a:r>
             </a:p>
           </p:txBody>
@@ -10172,7 +10172,7 @@
                     <a:sysClr val="windowText" lastClr="000000"/>
                   </a:solidFill>
                 </a:rPr>
-                <a:t>3 x (H/32 x W/32 </a:t>
+                <a:t>H/32 x W/32 </a:t>
               </a:r>
             </a:p>
             <a:p>
@@ -10183,7 +10183,7 @@
                     <a:sysClr val="windowText" lastClr="000000"/>
                   </a:solidFill>
                 </a:rPr>
-                <a:t>x (5+K))</a:t>
+                <a:t>x 3*(5+K)</a:t>
               </a:r>
               <a:endParaRPr lang="ko-KR" altLang="en-US" sz="800" dirty="0">
                 <a:solidFill>
@@ -10289,7 +10289,7 @@
                     <a:sysClr val="windowText" lastClr="000000"/>
                   </a:solidFill>
                 </a:rPr>
-                <a:t>3 x (H/16 x W/16 </a:t>
+                <a:t>H/16 x W/16 </a:t>
               </a:r>
             </a:p>
             <a:p>
@@ -10300,7 +10300,7 @@
                     <a:sysClr val="windowText" lastClr="000000"/>
                   </a:solidFill>
                 </a:rPr>
-                <a:t>x (5+K))</a:t>
+                <a:t>x 3*(5+K)</a:t>
               </a:r>
               <a:endParaRPr lang="ko-KR" altLang="en-US" sz="800" dirty="0">
                 <a:solidFill>
@@ -10405,7 +10405,7 @@
                     <a:sysClr val="windowText" lastClr="000000"/>
                   </a:solidFill>
                 </a:rPr>
-                <a:t>3 x (H/8 x W/8 </a:t>
+                <a:t>H/8 x W/8 </a:t>
               </a:r>
             </a:p>
             <a:p>
@@ -10416,7 +10416,7 @@
                     <a:sysClr val="windowText" lastClr="000000"/>
                   </a:solidFill>
                 </a:rPr>
-                <a:t>x (5+K))</a:t>
+                <a:t>x 3*(5+K)</a:t>
               </a:r>
               <a:endParaRPr lang="ko-KR" altLang="en-US" sz="800" dirty="0">
                 <a:solidFill>

</xml_diff>

<commit_message>
(sp) update average_list function
</commit_message>
<xml_diff>
--- a/assets/detector/figures.pptx
+++ b/assets/detector/figures.pptx
@@ -10,6 +10,7 @@
     <p:sldId id="258" r:id="rId4"/>
     <p:sldId id="259" r:id="rId5"/>
     <p:sldId id="260" r:id="rId6"/>
+    <p:sldId id="261" r:id="rId7"/>
   </p:sldIdLst>
   <p:sldSz cx="12192000" cy="6858000"/>
   <p:notesSz cx="6858000" cy="9144000"/>
@@ -116,6 +117,18 @@
 </p:presentation>
 </file>
 
+<file path=ppt/commentAuthors.xml><?xml version="1.0" encoding="utf-8"?>
+<p:cmAuthorLst xmlns:a="http://schemas.openxmlformats.org/drawingml/2006/main" xmlns:r="http://schemas.openxmlformats.org/officeDocument/2006/relationships" xmlns:p="http://schemas.openxmlformats.org/presentationml/2006/main">
+  <p:cmAuthor id="1" name="Hyukdoo Choi" initials="HC" lastIdx="1" clrIdx="0">
+    <p:extLst>
+      <p:ext uri="{19B8F6BF-5375-455C-9EA6-DF929625EA0E}">
+        <p15:presenceInfo xmlns:p15="http://schemas.microsoft.com/office/powerpoint/2012/main" userId="Hyukdoo Choi" providerId="None"/>
+      </p:ext>
+    </p:extLst>
+  </p:cmAuthor>
+</p:cmAuthorLst>
+</file>
+
 <file path=ppt/slideLayouts/slideLayout1.xml><?xml version="1.0" encoding="utf-8"?>
 <p:sldLayout xmlns:a="http://schemas.openxmlformats.org/drawingml/2006/main" xmlns:r="http://schemas.openxmlformats.org/officeDocument/2006/relationships" xmlns:p="http://schemas.openxmlformats.org/presentationml/2006/main" type="title" preserve="1">
   <p:cSld name="제목 슬라이드">
@@ -263,7 +276,7 @@
           <a:p>
             <a:fld id="{B14EE84C-1BA9-492D-BEBF-4AB0B5FCE851}" type="datetimeFigureOut">
               <a:rPr lang="ko-KR" altLang="en-US" smtClean="0"/>
-              <a:t>2021-03-04</a:t>
+              <a:t>2021-04-06</a:t>
             </a:fld>
             <a:endParaRPr lang="ko-KR" altLang="en-US"/>
           </a:p>
@@ -461,7 +474,7 @@
           <a:p>
             <a:fld id="{B14EE84C-1BA9-492D-BEBF-4AB0B5FCE851}" type="datetimeFigureOut">
               <a:rPr lang="ko-KR" altLang="en-US" smtClean="0"/>
-              <a:t>2021-03-04</a:t>
+              <a:t>2021-04-06</a:t>
             </a:fld>
             <a:endParaRPr lang="ko-KR" altLang="en-US"/>
           </a:p>
@@ -669,7 +682,7 @@
           <a:p>
             <a:fld id="{B14EE84C-1BA9-492D-BEBF-4AB0B5FCE851}" type="datetimeFigureOut">
               <a:rPr lang="ko-KR" altLang="en-US" smtClean="0"/>
-              <a:t>2021-03-04</a:t>
+              <a:t>2021-04-06</a:t>
             </a:fld>
             <a:endParaRPr lang="ko-KR" altLang="en-US"/>
           </a:p>
@@ -867,7 +880,7 @@
           <a:p>
             <a:fld id="{B14EE84C-1BA9-492D-BEBF-4AB0B5FCE851}" type="datetimeFigureOut">
               <a:rPr lang="ko-KR" altLang="en-US" smtClean="0"/>
-              <a:t>2021-03-04</a:t>
+              <a:t>2021-04-06</a:t>
             </a:fld>
             <a:endParaRPr lang="ko-KR" altLang="en-US"/>
           </a:p>
@@ -1142,7 +1155,7 @@
           <a:p>
             <a:fld id="{B14EE84C-1BA9-492D-BEBF-4AB0B5FCE851}" type="datetimeFigureOut">
               <a:rPr lang="ko-KR" altLang="en-US" smtClean="0"/>
-              <a:t>2021-03-04</a:t>
+              <a:t>2021-04-06</a:t>
             </a:fld>
             <a:endParaRPr lang="ko-KR" altLang="en-US"/>
           </a:p>
@@ -1407,7 +1420,7 @@
           <a:p>
             <a:fld id="{B14EE84C-1BA9-492D-BEBF-4AB0B5FCE851}" type="datetimeFigureOut">
               <a:rPr lang="ko-KR" altLang="en-US" smtClean="0"/>
-              <a:t>2021-03-04</a:t>
+              <a:t>2021-04-06</a:t>
             </a:fld>
             <a:endParaRPr lang="ko-KR" altLang="en-US"/>
           </a:p>
@@ -1819,7 +1832,7 @@
           <a:p>
             <a:fld id="{B14EE84C-1BA9-492D-BEBF-4AB0B5FCE851}" type="datetimeFigureOut">
               <a:rPr lang="ko-KR" altLang="en-US" smtClean="0"/>
-              <a:t>2021-03-04</a:t>
+              <a:t>2021-04-06</a:t>
             </a:fld>
             <a:endParaRPr lang="ko-KR" altLang="en-US"/>
           </a:p>
@@ -1960,7 +1973,7 @@
           <a:p>
             <a:fld id="{B14EE84C-1BA9-492D-BEBF-4AB0B5FCE851}" type="datetimeFigureOut">
               <a:rPr lang="ko-KR" altLang="en-US" smtClean="0"/>
-              <a:t>2021-03-04</a:t>
+              <a:t>2021-04-06</a:t>
             </a:fld>
             <a:endParaRPr lang="ko-KR" altLang="en-US"/>
           </a:p>
@@ -2073,7 +2086,7 @@
           <a:p>
             <a:fld id="{B14EE84C-1BA9-492D-BEBF-4AB0B5FCE851}" type="datetimeFigureOut">
               <a:rPr lang="ko-KR" altLang="en-US" smtClean="0"/>
-              <a:t>2021-03-04</a:t>
+              <a:t>2021-04-06</a:t>
             </a:fld>
             <a:endParaRPr lang="ko-KR" altLang="en-US"/>
           </a:p>
@@ -2384,7 +2397,7 @@
           <a:p>
             <a:fld id="{B14EE84C-1BA9-492D-BEBF-4AB0B5FCE851}" type="datetimeFigureOut">
               <a:rPr lang="ko-KR" altLang="en-US" smtClean="0"/>
-              <a:t>2021-03-04</a:t>
+              <a:t>2021-04-06</a:t>
             </a:fld>
             <a:endParaRPr lang="ko-KR" altLang="en-US"/>
           </a:p>
@@ -2672,7 +2685,7 @@
           <a:p>
             <a:fld id="{B14EE84C-1BA9-492D-BEBF-4AB0B5FCE851}" type="datetimeFigureOut">
               <a:rPr lang="ko-KR" altLang="en-US" smtClean="0"/>
-              <a:t>2021-03-04</a:t>
+              <a:t>2021-04-06</a:t>
             </a:fld>
             <a:endParaRPr lang="ko-KR" altLang="en-US"/>
           </a:p>
@@ -2913,7 +2926,7 @@
           <a:p>
             <a:fld id="{B14EE84C-1BA9-492D-BEBF-4AB0B5FCE851}" type="datetimeFigureOut">
               <a:rPr lang="ko-KR" altLang="en-US" smtClean="0"/>
-              <a:t>2021-03-04</a:t>
+              <a:t>2021-04-06</a:t>
             </a:fld>
             <a:endParaRPr lang="ko-KR" altLang="en-US"/>
           </a:p>
@@ -12065,6 +12078,1518 @@
 </p:sld>
 </file>
 
+<file path=ppt/slides/slide6.xml><?xml version="1.0" encoding="utf-8"?>
+<p:sld xmlns:a="http://schemas.openxmlformats.org/drawingml/2006/main" xmlns:r="http://schemas.openxmlformats.org/officeDocument/2006/relationships" xmlns:p="http://schemas.openxmlformats.org/presentationml/2006/main">
+  <p:cSld>
+    <p:spTree>
+      <p:nvGrpSpPr>
+        <p:cNvPr id="1" name=""/>
+        <p:cNvGrpSpPr/>
+        <p:nvPr/>
+      </p:nvGrpSpPr>
+      <p:grpSpPr>
+        <a:xfrm>
+          <a:off x="0" y="0"/>
+          <a:ext cx="0" cy="0"/>
+          <a:chOff x="0" y="0"/>
+          <a:chExt cx="0" cy="0"/>
+        </a:xfrm>
+      </p:grpSpPr>
+      <p:grpSp>
+        <p:nvGrpSpPr>
+          <p:cNvPr id="50" name="그룹 49">
+            <a:extLst>
+              <a:ext uri="{FF2B5EF4-FFF2-40B4-BE49-F238E27FC236}">
+                <a16:creationId xmlns:a16="http://schemas.microsoft.com/office/drawing/2014/main" id="{65287504-9BB0-4CD5-A2D2-F9EBCA8D9805}"/>
+              </a:ext>
+            </a:extLst>
+          </p:cNvPr>
+          <p:cNvGrpSpPr/>
+          <p:nvPr/>
+        </p:nvGrpSpPr>
+        <p:grpSpPr>
+          <a:xfrm>
+            <a:off x="1232844" y="1235310"/>
+            <a:ext cx="5623332" cy="3552187"/>
+            <a:chOff x="1232844" y="1235310"/>
+            <a:chExt cx="5623332" cy="3552187"/>
+          </a:xfrm>
+        </p:grpSpPr>
+        <p:pic>
+          <p:nvPicPr>
+            <p:cNvPr id="2" name="그림 1">
+              <a:extLst>
+                <a:ext uri="{FF2B5EF4-FFF2-40B4-BE49-F238E27FC236}">
+                  <a16:creationId xmlns:a16="http://schemas.microsoft.com/office/drawing/2014/main" id="{D21405E0-B23E-46B7-89DB-E2B1E82B4E51}"/>
+                </a:ext>
+              </a:extLst>
+            </p:cNvPr>
+            <p:cNvPicPr>
+              <a:picLocks noChangeAspect="1"/>
+            </p:cNvPicPr>
+            <p:nvPr/>
+          </p:nvPicPr>
+          <p:blipFill>
+            <a:blip r:embed="rId2"/>
+            <a:stretch>
+              <a:fillRect/>
+            </a:stretch>
+          </p:blipFill>
+          <p:spPr>
+            <a:xfrm>
+              <a:off x="1232844" y="1766409"/>
+              <a:ext cx="3163866" cy="1390421"/>
+            </a:xfrm>
+            <a:prstGeom prst="rect">
+              <a:avLst/>
+            </a:prstGeom>
+          </p:spPr>
+        </p:pic>
+        <p:sp>
+          <p:nvSpPr>
+            <p:cNvPr id="3" name="순서도: 데이터 2">
+              <a:extLst>
+                <a:ext uri="{FF2B5EF4-FFF2-40B4-BE49-F238E27FC236}">
+                  <a16:creationId xmlns:a16="http://schemas.microsoft.com/office/drawing/2014/main" id="{E295B629-752B-40E1-93ED-83401EAC928D}"/>
+                </a:ext>
+              </a:extLst>
+            </p:cNvPr>
+            <p:cNvSpPr/>
+            <p:nvPr/>
+          </p:nvSpPr>
+          <p:spPr>
+            <a:xfrm>
+              <a:off x="4831644" y="1573864"/>
+              <a:ext cx="432000" cy="324000"/>
+            </a:xfrm>
+            <a:prstGeom prst="flowChartInputOutput">
+              <a:avLst/>
+            </a:prstGeom>
+            <a:solidFill>
+              <a:schemeClr val="bg2"/>
+            </a:solidFill>
+            <a:ln>
+              <a:solidFill>
+                <a:schemeClr val="bg1">
+                  <a:lumMod val="50000"/>
+                </a:schemeClr>
+              </a:solidFill>
+            </a:ln>
+          </p:spPr>
+          <p:style>
+            <a:lnRef idx="2">
+              <a:schemeClr val="accent1">
+                <a:shade val="50000"/>
+              </a:schemeClr>
+            </a:lnRef>
+            <a:fillRef idx="1">
+              <a:schemeClr val="accent1"/>
+            </a:fillRef>
+            <a:effectRef idx="0">
+              <a:schemeClr val="accent1"/>
+            </a:effectRef>
+            <a:fontRef idx="minor">
+              <a:schemeClr val="lt1"/>
+            </a:fontRef>
+          </p:style>
+          <p:txBody>
+            <a:bodyPr rtlCol="0" anchor="ctr"/>
+            <a:lstStyle/>
+            <a:p>
+              <a:pPr algn="ctr"/>
+              <a:endParaRPr lang="ko-KR" altLang="en-US"/>
+            </a:p>
+          </p:txBody>
+        </p:sp>
+        <p:sp>
+          <p:nvSpPr>
+            <p:cNvPr id="4" name="순서도: 데이터 3">
+              <a:extLst>
+                <a:ext uri="{FF2B5EF4-FFF2-40B4-BE49-F238E27FC236}">
+                  <a16:creationId xmlns:a16="http://schemas.microsoft.com/office/drawing/2014/main" id="{B5C7685E-18A2-4E39-8379-0D744A0CD8E9}"/>
+                </a:ext>
+              </a:extLst>
+            </p:cNvPr>
+            <p:cNvSpPr/>
+            <p:nvPr/>
+          </p:nvSpPr>
+          <p:spPr>
+            <a:xfrm>
+              <a:off x="5229777" y="1573864"/>
+              <a:ext cx="432000" cy="324000"/>
+            </a:xfrm>
+            <a:prstGeom prst="flowChartInputOutput">
+              <a:avLst/>
+            </a:prstGeom>
+            <a:solidFill>
+              <a:schemeClr val="bg2"/>
+            </a:solidFill>
+            <a:ln>
+              <a:solidFill>
+                <a:schemeClr val="bg1">
+                  <a:lumMod val="50000"/>
+                </a:schemeClr>
+              </a:solidFill>
+            </a:ln>
+          </p:spPr>
+          <p:style>
+            <a:lnRef idx="2">
+              <a:schemeClr val="accent1">
+                <a:shade val="50000"/>
+              </a:schemeClr>
+            </a:lnRef>
+            <a:fillRef idx="1">
+              <a:schemeClr val="accent1"/>
+            </a:fillRef>
+            <a:effectRef idx="0">
+              <a:schemeClr val="accent1"/>
+            </a:effectRef>
+            <a:fontRef idx="minor">
+              <a:schemeClr val="lt1"/>
+            </a:fontRef>
+          </p:style>
+          <p:txBody>
+            <a:bodyPr rtlCol="0" anchor="ctr"/>
+            <a:lstStyle/>
+            <a:p>
+              <a:pPr algn="ctr"/>
+              <a:endParaRPr lang="ko-KR" altLang="en-US"/>
+            </a:p>
+          </p:txBody>
+        </p:sp>
+        <p:sp>
+          <p:nvSpPr>
+            <p:cNvPr id="5" name="순서도: 데이터 4">
+              <a:extLst>
+                <a:ext uri="{FF2B5EF4-FFF2-40B4-BE49-F238E27FC236}">
+                  <a16:creationId xmlns:a16="http://schemas.microsoft.com/office/drawing/2014/main" id="{AF1D92F2-9BB4-48AD-A35C-63BC188F270E}"/>
+                </a:ext>
+              </a:extLst>
+            </p:cNvPr>
+            <p:cNvSpPr/>
+            <p:nvPr/>
+          </p:nvSpPr>
+          <p:spPr>
+            <a:xfrm>
+              <a:off x="5627910" y="1573864"/>
+              <a:ext cx="432000" cy="324000"/>
+            </a:xfrm>
+            <a:prstGeom prst="flowChartInputOutput">
+              <a:avLst/>
+            </a:prstGeom>
+            <a:solidFill>
+              <a:schemeClr val="bg2"/>
+            </a:solidFill>
+            <a:ln>
+              <a:solidFill>
+                <a:schemeClr val="bg1">
+                  <a:lumMod val="50000"/>
+                </a:schemeClr>
+              </a:solidFill>
+            </a:ln>
+          </p:spPr>
+          <p:style>
+            <a:lnRef idx="2">
+              <a:schemeClr val="accent1">
+                <a:shade val="50000"/>
+              </a:schemeClr>
+            </a:lnRef>
+            <a:fillRef idx="1">
+              <a:schemeClr val="accent1"/>
+            </a:fillRef>
+            <a:effectRef idx="0">
+              <a:schemeClr val="accent1"/>
+            </a:effectRef>
+            <a:fontRef idx="minor">
+              <a:schemeClr val="lt1"/>
+            </a:fontRef>
+          </p:style>
+          <p:txBody>
+            <a:bodyPr rtlCol="0" anchor="ctr"/>
+            <a:lstStyle/>
+            <a:p>
+              <a:pPr algn="ctr"/>
+              <a:endParaRPr lang="ko-KR" altLang="en-US"/>
+            </a:p>
+          </p:txBody>
+        </p:sp>
+        <p:sp>
+          <p:nvSpPr>
+            <p:cNvPr id="6" name="순서도: 데이터 5">
+              <a:extLst>
+                <a:ext uri="{FF2B5EF4-FFF2-40B4-BE49-F238E27FC236}">
+                  <a16:creationId xmlns:a16="http://schemas.microsoft.com/office/drawing/2014/main" id="{7B6DBFEC-7761-4393-836D-C81950837C2E}"/>
+                </a:ext>
+              </a:extLst>
+            </p:cNvPr>
+            <p:cNvSpPr/>
+            <p:nvPr/>
+          </p:nvSpPr>
+          <p:spPr>
+            <a:xfrm>
+              <a:off x="6026043" y="1573864"/>
+              <a:ext cx="432000" cy="324000"/>
+            </a:xfrm>
+            <a:prstGeom prst="flowChartInputOutput">
+              <a:avLst/>
+            </a:prstGeom>
+            <a:solidFill>
+              <a:schemeClr val="bg2"/>
+            </a:solidFill>
+            <a:ln>
+              <a:solidFill>
+                <a:schemeClr val="bg1">
+                  <a:lumMod val="50000"/>
+                </a:schemeClr>
+              </a:solidFill>
+            </a:ln>
+          </p:spPr>
+          <p:style>
+            <a:lnRef idx="2">
+              <a:schemeClr val="accent1">
+                <a:shade val="50000"/>
+              </a:schemeClr>
+            </a:lnRef>
+            <a:fillRef idx="1">
+              <a:schemeClr val="accent1"/>
+            </a:fillRef>
+            <a:effectRef idx="0">
+              <a:schemeClr val="accent1"/>
+            </a:effectRef>
+            <a:fontRef idx="minor">
+              <a:schemeClr val="lt1"/>
+            </a:fontRef>
+          </p:style>
+          <p:txBody>
+            <a:bodyPr rtlCol="0" anchor="ctr"/>
+            <a:lstStyle/>
+            <a:p>
+              <a:pPr algn="ctr"/>
+              <a:endParaRPr lang="ko-KR" altLang="en-US"/>
+            </a:p>
+          </p:txBody>
+        </p:sp>
+        <p:sp>
+          <p:nvSpPr>
+            <p:cNvPr id="7" name="순서도: 데이터 6">
+              <a:extLst>
+                <a:ext uri="{FF2B5EF4-FFF2-40B4-BE49-F238E27FC236}">
+                  <a16:creationId xmlns:a16="http://schemas.microsoft.com/office/drawing/2014/main" id="{49D657CC-51B0-4A6C-97DD-BF3860E9BD45}"/>
+                </a:ext>
+              </a:extLst>
+            </p:cNvPr>
+            <p:cNvSpPr/>
+            <p:nvPr/>
+          </p:nvSpPr>
+          <p:spPr>
+            <a:xfrm>
+              <a:off x="6424176" y="1573864"/>
+              <a:ext cx="432000" cy="324000"/>
+            </a:xfrm>
+            <a:prstGeom prst="flowChartInputOutput">
+              <a:avLst/>
+            </a:prstGeom>
+            <a:solidFill>
+              <a:schemeClr val="bg2"/>
+            </a:solidFill>
+            <a:ln>
+              <a:solidFill>
+                <a:schemeClr val="bg1">
+                  <a:lumMod val="50000"/>
+                </a:schemeClr>
+              </a:solidFill>
+            </a:ln>
+          </p:spPr>
+          <p:style>
+            <a:lnRef idx="2">
+              <a:schemeClr val="accent1">
+                <a:shade val="50000"/>
+              </a:schemeClr>
+            </a:lnRef>
+            <a:fillRef idx="1">
+              <a:schemeClr val="accent1"/>
+            </a:fillRef>
+            <a:effectRef idx="0">
+              <a:schemeClr val="accent1"/>
+            </a:effectRef>
+            <a:fontRef idx="minor">
+              <a:schemeClr val="lt1"/>
+            </a:fontRef>
+          </p:style>
+          <p:txBody>
+            <a:bodyPr rtlCol="0" anchor="ctr"/>
+            <a:lstStyle/>
+            <a:p>
+              <a:pPr algn="ctr"/>
+              <a:endParaRPr lang="ko-KR" altLang="en-US"/>
+            </a:p>
+          </p:txBody>
+        </p:sp>
+        <p:sp>
+          <p:nvSpPr>
+            <p:cNvPr id="8" name="순서도: 데이터 7">
+              <a:extLst>
+                <a:ext uri="{FF2B5EF4-FFF2-40B4-BE49-F238E27FC236}">
+                  <a16:creationId xmlns:a16="http://schemas.microsoft.com/office/drawing/2014/main" id="{DA228230-85E7-4634-879A-0FE84BD27F7F}"/>
+                </a:ext>
+              </a:extLst>
+            </p:cNvPr>
+            <p:cNvSpPr/>
+            <p:nvPr/>
+          </p:nvSpPr>
+          <p:spPr>
+            <a:xfrm>
+              <a:off x="4741332" y="1954309"/>
+              <a:ext cx="432000" cy="324000"/>
+            </a:xfrm>
+            <a:prstGeom prst="flowChartInputOutput">
+              <a:avLst/>
+            </a:prstGeom>
+            <a:solidFill>
+              <a:schemeClr val="bg2"/>
+            </a:solidFill>
+            <a:ln>
+              <a:solidFill>
+                <a:schemeClr val="bg1">
+                  <a:lumMod val="50000"/>
+                </a:schemeClr>
+              </a:solidFill>
+            </a:ln>
+          </p:spPr>
+          <p:style>
+            <a:lnRef idx="2">
+              <a:schemeClr val="accent1">
+                <a:shade val="50000"/>
+              </a:schemeClr>
+            </a:lnRef>
+            <a:fillRef idx="1">
+              <a:schemeClr val="accent1"/>
+            </a:fillRef>
+            <a:effectRef idx="0">
+              <a:schemeClr val="accent1"/>
+            </a:effectRef>
+            <a:fontRef idx="minor">
+              <a:schemeClr val="lt1"/>
+            </a:fontRef>
+          </p:style>
+          <p:txBody>
+            <a:bodyPr rtlCol="0" anchor="ctr"/>
+            <a:lstStyle/>
+            <a:p>
+              <a:pPr algn="ctr"/>
+              <a:endParaRPr lang="ko-KR" altLang="en-US"/>
+            </a:p>
+          </p:txBody>
+        </p:sp>
+        <p:sp>
+          <p:nvSpPr>
+            <p:cNvPr id="9" name="순서도: 데이터 8">
+              <a:extLst>
+                <a:ext uri="{FF2B5EF4-FFF2-40B4-BE49-F238E27FC236}">
+                  <a16:creationId xmlns:a16="http://schemas.microsoft.com/office/drawing/2014/main" id="{04A7F6F1-74A6-4AA4-AD18-EF20DF87BA47}"/>
+                </a:ext>
+              </a:extLst>
+            </p:cNvPr>
+            <p:cNvSpPr/>
+            <p:nvPr/>
+          </p:nvSpPr>
+          <p:spPr>
+            <a:xfrm>
+              <a:off x="5139465" y="1954309"/>
+              <a:ext cx="432000" cy="324000"/>
+            </a:xfrm>
+            <a:prstGeom prst="flowChartInputOutput">
+              <a:avLst/>
+            </a:prstGeom>
+            <a:solidFill>
+              <a:schemeClr val="accent2"/>
+            </a:solidFill>
+            <a:ln>
+              <a:solidFill>
+                <a:schemeClr val="accent2">
+                  <a:lumMod val="50000"/>
+                </a:schemeClr>
+              </a:solidFill>
+            </a:ln>
+          </p:spPr>
+          <p:style>
+            <a:lnRef idx="2">
+              <a:schemeClr val="accent1">
+                <a:shade val="50000"/>
+              </a:schemeClr>
+            </a:lnRef>
+            <a:fillRef idx="1">
+              <a:schemeClr val="accent1"/>
+            </a:fillRef>
+            <a:effectRef idx="0">
+              <a:schemeClr val="accent1"/>
+            </a:effectRef>
+            <a:fontRef idx="minor">
+              <a:schemeClr val="lt1"/>
+            </a:fontRef>
+          </p:style>
+          <p:txBody>
+            <a:bodyPr rtlCol="0" anchor="ctr"/>
+            <a:lstStyle/>
+            <a:p>
+              <a:pPr algn="ctr"/>
+              <a:endParaRPr lang="ko-KR" altLang="en-US"/>
+            </a:p>
+          </p:txBody>
+        </p:sp>
+        <p:sp>
+          <p:nvSpPr>
+            <p:cNvPr id="10" name="순서도: 데이터 9">
+              <a:extLst>
+                <a:ext uri="{FF2B5EF4-FFF2-40B4-BE49-F238E27FC236}">
+                  <a16:creationId xmlns:a16="http://schemas.microsoft.com/office/drawing/2014/main" id="{E8F20815-42DD-4F8D-BB60-E87083695AED}"/>
+                </a:ext>
+              </a:extLst>
+            </p:cNvPr>
+            <p:cNvSpPr/>
+            <p:nvPr/>
+          </p:nvSpPr>
+          <p:spPr>
+            <a:xfrm>
+              <a:off x="5537598" y="1954309"/>
+              <a:ext cx="432000" cy="324000"/>
+            </a:xfrm>
+            <a:prstGeom prst="flowChartInputOutput">
+              <a:avLst/>
+            </a:prstGeom>
+            <a:solidFill>
+              <a:schemeClr val="bg2"/>
+            </a:solidFill>
+            <a:ln>
+              <a:solidFill>
+                <a:schemeClr val="bg1">
+                  <a:lumMod val="50000"/>
+                </a:schemeClr>
+              </a:solidFill>
+            </a:ln>
+          </p:spPr>
+          <p:style>
+            <a:lnRef idx="2">
+              <a:schemeClr val="accent1">
+                <a:shade val="50000"/>
+              </a:schemeClr>
+            </a:lnRef>
+            <a:fillRef idx="1">
+              <a:schemeClr val="accent1"/>
+            </a:fillRef>
+            <a:effectRef idx="0">
+              <a:schemeClr val="accent1"/>
+            </a:effectRef>
+            <a:fontRef idx="minor">
+              <a:schemeClr val="lt1"/>
+            </a:fontRef>
+          </p:style>
+          <p:txBody>
+            <a:bodyPr rtlCol="0" anchor="ctr"/>
+            <a:lstStyle/>
+            <a:p>
+              <a:pPr algn="ctr"/>
+              <a:endParaRPr lang="ko-KR" altLang="en-US"/>
+            </a:p>
+          </p:txBody>
+        </p:sp>
+        <p:sp>
+          <p:nvSpPr>
+            <p:cNvPr id="11" name="순서도: 데이터 10">
+              <a:extLst>
+                <a:ext uri="{FF2B5EF4-FFF2-40B4-BE49-F238E27FC236}">
+                  <a16:creationId xmlns:a16="http://schemas.microsoft.com/office/drawing/2014/main" id="{C6827178-A66E-4048-BB88-83CB944CF9A6}"/>
+                </a:ext>
+              </a:extLst>
+            </p:cNvPr>
+            <p:cNvSpPr/>
+            <p:nvPr/>
+          </p:nvSpPr>
+          <p:spPr>
+            <a:xfrm>
+              <a:off x="5935731" y="1954309"/>
+              <a:ext cx="432000" cy="324000"/>
+            </a:xfrm>
+            <a:prstGeom prst="flowChartInputOutput">
+              <a:avLst/>
+            </a:prstGeom>
+            <a:solidFill>
+              <a:schemeClr val="bg2"/>
+            </a:solidFill>
+            <a:ln>
+              <a:solidFill>
+                <a:schemeClr val="bg1">
+                  <a:lumMod val="50000"/>
+                </a:schemeClr>
+              </a:solidFill>
+            </a:ln>
+          </p:spPr>
+          <p:style>
+            <a:lnRef idx="2">
+              <a:schemeClr val="accent1">
+                <a:shade val="50000"/>
+              </a:schemeClr>
+            </a:lnRef>
+            <a:fillRef idx="1">
+              <a:schemeClr val="accent1"/>
+            </a:fillRef>
+            <a:effectRef idx="0">
+              <a:schemeClr val="accent1"/>
+            </a:effectRef>
+            <a:fontRef idx="minor">
+              <a:schemeClr val="lt1"/>
+            </a:fontRef>
+          </p:style>
+          <p:txBody>
+            <a:bodyPr rtlCol="0" anchor="ctr"/>
+            <a:lstStyle/>
+            <a:p>
+              <a:pPr algn="ctr"/>
+              <a:endParaRPr lang="ko-KR" altLang="en-US"/>
+            </a:p>
+          </p:txBody>
+        </p:sp>
+        <p:sp>
+          <p:nvSpPr>
+            <p:cNvPr id="12" name="순서도: 데이터 11">
+              <a:extLst>
+                <a:ext uri="{FF2B5EF4-FFF2-40B4-BE49-F238E27FC236}">
+                  <a16:creationId xmlns:a16="http://schemas.microsoft.com/office/drawing/2014/main" id="{93459587-5F36-4B73-8F55-86AEBDF32664}"/>
+                </a:ext>
+              </a:extLst>
+            </p:cNvPr>
+            <p:cNvSpPr/>
+            <p:nvPr/>
+          </p:nvSpPr>
+          <p:spPr>
+            <a:xfrm>
+              <a:off x="6333864" y="1954309"/>
+              <a:ext cx="432000" cy="324000"/>
+            </a:xfrm>
+            <a:prstGeom prst="flowChartInputOutput">
+              <a:avLst/>
+            </a:prstGeom>
+            <a:solidFill>
+              <a:schemeClr val="bg2"/>
+            </a:solidFill>
+            <a:ln>
+              <a:solidFill>
+                <a:schemeClr val="bg1">
+                  <a:lumMod val="50000"/>
+                </a:schemeClr>
+              </a:solidFill>
+            </a:ln>
+          </p:spPr>
+          <p:style>
+            <a:lnRef idx="2">
+              <a:schemeClr val="accent1">
+                <a:shade val="50000"/>
+              </a:schemeClr>
+            </a:lnRef>
+            <a:fillRef idx="1">
+              <a:schemeClr val="accent1"/>
+            </a:fillRef>
+            <a:effectRef idx="0">
+              <a:schemeClr val="accent1"/>
+            </a:effectRef>
+            <a:fontRef idx="minor">
+              <a:schemeClr val="lt1"/>
+            </a:fontRef>
+          </p:style>
+          <p:txBody>
+            <a:bodyPr rtlCol="0" anchor="ctr"/>
+            <a:lstStyle/>
+            <a:p>
+              <a:pPr algn="ctr"/>
+              <a:endParaRPr lang="ko-KR" altLang="en-US"/>
+            </a:p>
+          </p:txBody>
+        </p:sp>
+        <p:pic>
+          <p:nvPicPr>
+            <p:cNvPr id="34" name="그림 33">
+              <a:extLst>
+                <a:ext uri="{FF2B5EF4-FFF2-40B4-BE49-F238E27FC236}">
+                  <a16:creationId xmlns:a16="http://schemas.microsoft.com/office/drawing/2014/main" id="{2DD4E9F6-A4F1-43C8-B8A3-9A64D75F9CFB}"/>
+                </a:ext>
+              </a:extLst>
+            </p:cNvPr>
+            <p:cNvPicPr>
+              <a:picLocks noChangeAspect="1"/>
+            </p:cNvPicPr>
+            <p:nvPr/>
+          </p:nvPicPr>
+          <p:blipFill>
+            <a:blip r:embed="rId3"/>
+            <a:stretch>
+              <a:fillRect/>
+            </a:stretch>
+          </p:blipFill>
+          <p:spPr>
+            <a:xfrm>
+              <a:off x="4556940" y="3233943"/>
+              <a:ext cx="2074205" cy="1553554"/>
+            </a:xfrm>
+            <a:prstGeom prst="rect">
+              <a:avLst/>
+            </a:prstGeom>
+          </p:spPr>
+        </p:pic>
+        <p:sp>
+          <p:nvSpPr>
+            <p:cNvPr id="35" name="직사각형 34">
+              <a:extLst>
+                <a:ext uri="{FF2B5EF4-FFF2-40B4-BE49-F238E27FC236}">
+                  <a16:creationId xmlns:a16="http://schemas.microsoft.com/office/drawing/2014/main" id="{D450BCE0-D247-41CF-BE75-2FECEA39A27C}"/>
+                </a:ext>
+              </a:extLst>
+            </p:cNvPr>
+            <p:cNvSpPr/>
+            <p:nvPr/>
+          </p:nvSpPr>
+          <p:spPr>
+            <a:xfrm>
+              <a:off x="4974666" y="3553519"/>
+              <a:ext cx="516267" cy="1233978"/>
+            </a:xfrm>
+            <a:prstGeom prst="rect">
+              <a:avLst/>
+            </a:prstGeom>
+            <a:noFill/>
+            <a:ln>
+              <a:solidFill>
+                <a:srgbClr val="FF0000"/>
+              </a:solidFill>
+            </a:ln>
+          </p:spPr>
+          <p:style>
+            <a:lnRef idx="2">
+              <a:schemeClr val="accent1">
+                <a:shade val="50000"/>
+              </a:schemeClr>
+            </a:lnRef>
+            <a:fillRef idx="1">
+              <a:schemeClr val="accent1"/>
+            </a:fillRef>
+            <a:effectRef idx="0">
+              <a:schemeClr val="accent1"/>
+            </a:effectRef>
+            <a:fontRef idx="minor">
+              <a:schemeClr val="lt1"/>
+            </a:fontRef>
+          </p:style>
+          <p:txBody>
+            <a:bodyPr rtlCol="0" anchor="ctr"/>
+            <a:lstStyle/>
+            <a:p>
+              <a:pPr algn="ctr"/>
+              <a:endParaRPr lang="ko-KR" altLang="en-US"/>
+            </a:p>
+          </p:txBody>
+        </p:sp>
+        <p:sp>
+          <p:nvSpPr>
+            <p:cNvPr id="36" name="직사각형 35">
+              <a:extLst>
+                <a:ext uri="{FF2B5EF4-FFF2-40B4-BE49-F238E27FC236}">
+                  <a16:creationId xmlns:a16="http://schemas.microsoft.com/office/drawing/2014/main" id="{A60BBECF-F76C-4B17-B5FB-009451299814}"/>
+                </a:ext>
+              </a:extLst>
+            </p:cNvPr>
+            <p:cNvSpPr/>
+            <p:nvPr/>
+          </p:nvSpPr>
+          <p:spPr>
+            <a:xfrm>
+              <a:off x="5694284" y="3614387"/>
+              <a:ext cx="516267" cy="1173109"/>
+            </a:xfrm>
+            <a:prstGeom prst="rect">
+              <a:avLst/>
+            </a:prstGeom>
+            <a:noFill/>
+            <a:ln>
+              <a:solidFill>
+                <a:srgbClr val="FF0000"/>
+              </a:solidFill>
+            </a:ln>
+          </p:spPr>
+          <p:style>
+            <a:lnRef idx="2">
+              <a:schemeClr val="accent1">
+                <a:shade val="50000"/>
+              </a:schemeClr>
+            </a:lnRef>
+            <a:fillRef idx="1">
+              <a:schemeClr val="accent1"/>
+            </a:fillRef>
+            <a:effectRef idx="0">
+              <a:schemeClr val="accent1"/>
+            </a:effectRef>
+            <a:fontRef idx="minor">
+              <a:schemeClr val="lt1"/>
+            </a:fontRef>
+          </p:style>
+          <p:txBody>
+            <a:bodyPr rtlCol="0" anchor="ctr"/>
+            <a:lstStyle/>
+            <a:p>
+              <a:pPr algn="ctr"/>
+              <a:endParaRPr lang="ko-KR" altLang="en-US"/>
+            </a:p>
+          </p:txBody>
+        </p:sp>
+        <p:cxnSp>
+          <p:nvCxnSpPr>
+            <p:cNvPr id="39" name="직선 화살표 연결선 38">
+              <a:extLst>
+                <a:ext uri="{FF2B5EF4-FFF2-40B4-BE49-F238E27FC236}">
+                  <a16:creationId xmlns:a16="http://schemas.microsoft.com/office/drawing/2014/main" id="{1C6DA02B-81C6-405D-9EEF-D4BABE20DF72}"/>
+                </a:ext>
+              </a:extLst>
+            </p:cNvPr>
+            <p:cNvCxnSpPr>
+              <a:cxnSpLocks/>
+              <a:endCxn id="23" idx="3"/>
+            </p:cNvCxnSpPr>
+            <p:nvPr/>
+          </p:nvCxnSpPr>
+          <p:spPr>
+            <a:xfrm flipV="1">
+              <a:off x="5904798" y="2658754"/>
+              <a:ext cx="100623" cy="1511754"/>
+            </a:xfrm>
+            <a:prstGeom prst="straightConnector1">
+              <a:avLst/>
+            </a:prstGeom>
+            <a:ln w="28575">
+              <a:solidFill>
+                <a:schemeClr val="accent3">
+                  <a:lumMod val="50000"/>
+                </a:schemeClr>
+              </a:solidFill>
+              <a:prstDash val="sysDash"/>
+              <a:tailEnd type="triangle"/>
+            </a:ln>
+          </p:spPr>
+          <p:style>
+            <a:lnRef idx="1">
+              <a:schemeClr val="accent1"/>
+            </a:lnRef>
+            <a:fillRef idx="0">
+              <a:schemeClr val="accent1"/>
+            </a:fillRef>
+            <a:effectRef idx="0">
+              <a:schemeClr val="accent1"/>
+            </a:effectRef>
+            <a:fontRef idx="minor">
+              <a:schemeClr val="tx1"/>
+            </a:fontRef>
+          </p:style>
+        </p:cxnSp>
+        <p:cxnSp>
+          <p:nvCxnSpPr>
+            <p:cNvPr id="40" name="직선 화살표 연결선 39">
+              <a:extLst>
+                <a:ext uri="{FF2B5EF4-FFF2-40B4-BE49-F238E27FC236}">
+                  <a16:creationId xmlns:a16="http://schemas.microsoft.com/office/drawing/2014/main" id="{04720230-770D-4BA7-8685-4F5F66223710}"/>
+                </a:ext>
+              </a:extLst>
+            </p:cNvPr>
+            <p:cNvCxnSpPr>
+              <a:cxnSpLocks/>
+              <a:endCxn id="9" idx="3"/>
+            </p:cNvCxnSpPr>
+            <p:nvPr/>
+          </p:nvCxnSpPr>
+          <p:spPr>
+            <a:xfrm flipV="1">
+              <a:off x="5262137" y="2278309"/>
+              <a:ext cx="50128" cy="1892199"/>
+            </a:xfrm>
+            <a:prstGeom prst="straightConnector1">
+              <a:avLst/>
+            </a:prstGeom>
+            <a:ln w="28575">
+              <a:solidFill>
+                <a:schemeClr val="accent3">
+                  <a:lumMod val="50000"/>
+                </a:schemeClr>
+              </a:solidFill>
+              <a:prstDash val="sysDash"/>
+              <a:tailEnd type="triangle"/>
+            </a:ln>
+          </p:spPr>
+          <p:style>
+            <a:lnRef idx="1">
+              <a:schemeClr val="accent1"/>
+            </a:lnRef>
+            <a:fillRef idx="0">
+              <a:schemeClr val="accent1"/>
+            </a:fillRef>
+            <a:effectRef idx="0">
+              <a:schemeClr val="accent1"/>
+            </a:effectRef>
+            <a:fontRef idx="minor">
+              <a:schemeClr val="tx1"/>
+            </a:fontRef>
+          </p:style>
+        </p:cxnSp>
+        <p:sp>
+          <p:nvSpPr>
+            <p:cNvPr id="20" name="순서도: 데이터 19">
+              <a:extLst>
+                <a:ext uri="{FF2B5EF4-FFF2-40B4-BE49-F238E27FC236}">
+                  <a16:creationId xmlns:a16="http://schemas.microsoft.com/office/drawing/2014/main" id="{1BA0D44D-8F29-4D63-8173-39E8A7CC47DD}"/>
+                </a:ext>
+              </a:extLst>
+            </p:cNvPr>
+            <p:cNvSpPr/>
+            <p:nvPr/>
+          </p:nvSpPr>
+          <p:spPr>
+            <a:xfrm>
+              <a:off x="4638222" y="2334754"/>
+              <a:ext cx="432000" cy="324000"/>
+            </a:xfrm>
+            <a:prstGeom prst="flowChartInputOutput">
+              <a:avLst/>
+            </a:prstGeom>
+            <a:solidFill>
+              <a:schemeClr val="bg2"/>
+            </a:solidFill>
+            <a:ln>
+              <a:solidFill>
+                <a:schemeClr val="bg1">
+                  <a:lumMod val="50000"/>
+                </a:schemeClr>
+              </a:solidFill>
+            </a:ln>
+          </p:spPr>
+          <p:style>
+            <a:lnRef idx="2">
+              <a:schemeClr val="accent1">
+                <a:shade val="50000"/>
+              </a:schemeClr>
+            </a:lnRef>
+            <a:fillRef idx="1">
+              <a:schemeClr val="accent1"/>
+            </a:fillRef>
+            <a:effectRef idx="0">
+              <a:schemeClr val="accent1"/>
+            </a:effectRef>
+            <a:fontRef idx="minor">
+              <a:schemeClr val="lt1"/>
+            </a:fontRef>
+          </p:style>
+          <p:txBody>
+            <a:bodyPr rtlCol="0" anchor="ctr"/>
+            <a:lstStyle/>
+            <a:p>
+              <a:pPr algn="ctr"/>
+              <a:endParaRPr lang="ko-KR" altLang="en-US"/>
+            </a:p>
+          </p:txBody>
+        </p:sp>
+        <p:sp>
+          <p:nvSpPr>
+            <p:cNvPr id="21" name="순서도: 데이터 20">
+              <a:extLst>
+                <a:ext uri="{FF2B5EF4-FFF2-40B4-BE49-F238E27FC236}">
+                  <a16:creationId xmlns:a16="http://schemas.microsoft.com/office/drawing/2014/main" id="{17496988-4781-4C72-ACD4-E0E89564897E}"/>
+                </a:ext>
+              </a:extLst>
+            </p:cNvPr>
+            <p:cNvSpPr/>
+            <p:nvPr/>
+          </p:nvSpPr>
+          <p:spPr>
+            <a:xfrm>
+              <a:off x="5036355" y="2334754"/>
+              <a:ext cx="432000" cy="324000"/>
+            </a:xfrm>
+            <a:prstGeom prst="flowChartInputOutput">
+              <a:avLst/>
+            </a:prstGeom>
+            <a:solidFill>
+              <a:schemeClr val="bg2"/>
+            </a:solidFill>
+            <a:ln>
+              <a:solidFill>
+                <a:schemeClr val="bg1">
+                  <a:lumMod val="50000"/>
+                </a:schemeClr>
+              </a:solidFill>
+            </a:ln>
+          </p:spPr>
+          <p:style>
+            <a:lnRef idx="2">
+              <a:schemeClr val="accent1">
+                <a:shade val="50000"/>
+              </a:schemeClr>
+            </a:lnRef>
+            <a:fillRef idx="1">
+              <a:schemeClr val="accent1"/>
+            </a:fillRef>
+            <a:effectRef idx="0">
+              <a:schemeClr val="accent1"/>
+            </a:effectRef>
+            <a:fontRef idx="minor">
+              <a:schemeClr val="lt1"/>
+            </a:fontRef>
+          </p:style>
+          <p:txBody>
+            <a:bodyPr rtlCol="0" anchor="ctr"/>
+            <a:lstStyle/>
+            <a:p>
+              <a:pPr algn="ctr"/>
+              <a:endParaRPr lang="ko-KR" altLang="en-US"/>
+            </a:p>
+          </p:txBody>
+        </p:sp>
+        <p:sp>
+          <p:nvSpPr>
+            <p:cNvPr id="22" name="순서도: 데이터 21">
+              <a:extLst>
+                <a:ext uri="{FF2B5EF4-FFF2-40B4-BE49-F238E27FC236}">
+                  <a16:creationId xmlns:a16="http://schemas.microsoft.com/office/drawing/2014/main" id="{A62E945A-8465-4CBD-9801-1415F689376F}"/>
+                </a:ext>
+              </a:extLst>
+            </p:cNvPr>
+            <p:cNvSpPr/>
+            <p:nvPr/>
+          </p:nvSpPr>
+          <p:spPr>
+            <a:xfrm>
+              <a:off x="5434488" y="2334754"/>
+              <a:ext cx="432000" cy="324000"/>
+            </a:xfrm>
+            <a:prstGeom prst="flowChartInputOutput">
+              <a:avLst/>
+            </a:prstGeom>
+            <a:solidFill>
+              <a:schemeClr val="bg2"/>
+            </a:solidFill>
+            <a:ln>
+              <a:solidFill>
+                <a:schemeClr val="bg1">
+                  <a:lumMod val="50000"/>
+                </a:schemeClr>
+              </a:solidFill>
+            </a:ln>
+          </p:spPr>
+          <p:style>
+            <a:lnRef idx="2">
+              <a:schemeClr val="accent1">
+                <a:shade val="50000"/>
+              </a:schemeClr>
+            </a:lnRef>
+            <a:fillRef idx="1">
+              <a:schemeClr val="accent1"/>
+            </a:fillRef>
+            <a:effectRef idx="0">
+              <a:schemeClr val="accent1"/>
+            </a:effectRef>
+            <a:fontRef idx="minor">
+              <a:schemeClr val="lt1"/>
+            </a:fontRef>
+          </p:style>
+          <p:txBody>
+            <a:bodyPr rtlCol="0" anchor="ctr"/>
+            <a:lstStyle/>
+            <a:p>
+              <a:pPr algn="ctr"/>
+              <a:endParaRPr lang="ko-KR" altLang="en-US"/>
+            </a:p>
+          </p:txBody>
+        </p:sp>
+        <p:sp>
+          <p:nvSpPr>
+            <p:cNvPr id="23" name="순서도: 데이터 22">
+              <a:extLst>
+                <a:ext uri="{FF2B5EF4-FFF2-40B4-BE49-F238E27FC236}">
+                  <a16:creationId xmlns:a16="http://schemas.microsoft.com/office/drawing/2014/main" id="{DECBE861-023A-4AED-93EF-FCFAC8C8DF46}"/>
+                </a:ext>
+              </a:extLst>
+            </p:cNvPr>
+            <p:cNvSpPr/>
+            <p:nvPr/>
+          </p:nvSpPr>
+          <p:spPr>
+            <a:xfrm>
+              <a:off x="5832621" y="2334754"/>
+              <a:ext cx="432000" cy="324000"/>
+            </a:xfrm>
+            <a:prstGeom prst="flowChartInputOutput">
+              <a:avLst/>
+            </a:prstGeom>
+            <a:solidFill>
+              <a:schemeClr val="accent2"/>
+            </a:solidFill>
+            <a:ln>
+              <a:solidFill>
+                <a:schemeClr val="accent2">
+                  <a:lumMod val="50000"/>
+                </a:schemeClr>
+              </a:solidFill>
+            </a:ln>
+          </p:spPr>
+          <p:style>
+            <a:lnRef idx="2">
+              <a:schemeClr val="accent1">
+                <a:shade val="50000"/>
+              </a:schemeClr>
+            </a:lnRef>
+            <a:fillRef idx="1">
+              <a:schemeClr val="accent1"/>
+            </a:fillRef>
+            <a:effectRef idx="0">
+              <a:schemeClr val="accent1"/>
+            </a:effectRef>
+            <a:fontRef idx="minor">
+              <a:schemeClr val="lt1"/>
+            </a:fontRef>
+          </p:style>
+          <p:txBody>
+            <a:bodyPr rtlCol="0" anchor="ctr"/>
+            <a:lstStyle/>
+            <a:p>
+              <a:pPr algn="ctr"/>
+              <a:endParaRPr lang="ko-KR" altLang="en-US"/>
+            </a:p>
+          </p:txBody>
+        </p:sp>
+        <p:sp>
+          <p:nvSpPr>
+            <p:cNvPr id="24" name="순서도: 데이터 23">
+              <a:extLst>
+                <a:ext uri="{FF2B5EF4-FFF2-40B4-BE49-F238E27FC236}">
+                  <a16:creationId xmlns:a16="http://schemas.microsoft.com/office/drawing/2014/main" id="{A36E857D-D199-47ED-8D85-6C7A38769F13}"/>
+                </a:ext>
+              </a:extLst>
+            </p:cNvPr>
+            <p:cNvSpPr/>
+            <p:nvPr/>
+          </p:nvSpPr>
+          <p:spPr>
+            <a:xfrm>
+              <a:off x="6230754" y="2334754"/>
+              <a:ext cx="432000" cy="324000"/>
+            </a:xfrm>
+            <a:prstGeom prst="flowChartInputOutput">
+              <a:avLst/>
+            </a:prstGeom>
+            <a:solidFill>
+              <a:schemeClr val="bg2"/>
+            </a:solidFill>
+            <a:ln>
+              <a:solidFill>
+                <a:schemeClr val="bg1">
+                  <a:lumMod val="50000"/>
+                </a:schemeClr>
+              </a:solidFill>
+            </a:ln>
+          </p:spPr>
+          <p:style>
+            <a:lnRef idx="2">
+              <a:schemeClr val="accent1">
+                <a:shade val="50000"/>
+              </a:schemeClr>
+            </a:lnRef>
+            <a:fillRef idx="1">
+              <a:schemeClr val="accent1"/>
+            </a:fillRef>
+            <a:effectRef idx="0">
+              <a:schemeClr val="accent1"/>
+            </a:effectRef>
+            <a:fontRef idx="minor">
+              <a:schemeClr val="lt1"/>
+            </a:fontRef>
+          </p:style>
+          <p:txBody>
+            <a:bodyPr rtlCol="0" anchor="ctr"/>
+            <a:lstStyle/>
+            <a:p>
+              <a:pPr algn="ctr"/>
+              <a:endParaRPr lang="ko-KR" altLang="en-US"/>
+            </a:p>
+          </p:txBody>
+        </p:sp>
+        <p:sp>
+          <p:nvSpPr>
+            <p:cNvPr id="26" name="순서도: 데이터 25">
+              <a:extLst>
+                <a:ext uri="{FF2B5EF4-FFF2-40B4-BE49-F238E27FC236}">
+                  <a16:creationId xmlns:a16="http://schemas.microsoft.com/office/drawing/2014/main" id="{43E6C8E2-558C-4CF5-9BAF-5168A930DE20}"/>
+                </a:ext>
+              </a:extLst>
+            </p:cNvPr>
+            <p:cNvSpPr/>
+            <p:nvPr/>
+          </p:nvSpPr>
+          <p:spPr>
+            <a:xfrm>
+              <a:off x="4536621" y="2715199"/>
+              <a:ext cx="432000" cy="324000"/>
+            </a:xfrm>
+            <a:prstGeom prst="flowChartInputOutput">
+              <a:avLst/>
+            </a:prstGeom>
+            <a:solidFill>
+              <a:schemeClr val="bg2"/>
+            </a:solidFill>
+            <a:ln>
+              <a:solidFill>
+                <a:schemeClr val="bg1">
+                  <a:lumMod val="50000"/>
+                </a:schemeClr>
+              </a:solidFill>
+            </a:ln>
+          </p:spPr>
+          <p:style>
+            <a:lnRef idx="2">
+              <a:schemeClr val="accent1">
+                <a:shade val="50000"/>
+              </a:schemeClr>
+            </a:lnRef>
+            <a:fillRef idx="1">
+              <a:schemeClr val="accent1"/>
+            </a:fillRef>
+            <a:effectRef idx="0">
+              <a:schemeClr val="accent1"/>
+            </a:effectRef>
+            <a:fontRef idx="minor">
+              <a:schemeClr val="lt1"/>
+            </a:fontRef>
+          </p:style>
+          <p:txBody>
+            <a:bodyPr rtlCol="0" anchor="ctr"/>
+            <a:lstStyle/>
+            <a:p>
+              <a:pPr algn="ctr"/>
+              <a:endParaRPr lang="ko-KR" altLang="en-US"/>
+            </a:p>
+          </p:txBody>
+        </p:sp>
+        <p:sp>
+          <p:nvSpPr>
+            <p:cNvPr id="27" name="순서도: 데이터 26">
+              <a:extLst>
+                <a:ext uri="{FF2B5EF4-FFF2-40B4-BE49-F238E27FC236}">
+                  <a16:creationId xmlns:a16="http://schemas.microsoft.com/office/drawing/2014/main" id="{E85DFC92-8C2A-4209-AACD-61855D0B3696}"/>
+                </a:ext>
+              </a:extLst>
+            </p:cNvPr>
+            <p:cNvSpPr/>
+            <p:nvPr/>
+          </p:nvSpPr>
+          <p:spPr>
+            <a:xfrm>
+              <a:off x="4934754" y="2715199"/>
+              <a:ext cx="432000" cy="324000"/>
+            </a:xfrm>
+            <a:prstGeom prst="flowChartInputOutput">
+              <a:avLst/>
+            </a:prstGeom>
+            <a:solidFill>
+              <a:schemeClr val="bg2"/>
+            </a:solidFill>
+            <a:ln>
+              <a:solidFill>
+                <a:schemeClr val="bg1">
+                  <a:lumMod val="50000"/>
+                </a:schemeClr>
+              </a:solidFill>
+            </a:ln>
+          </p:spPr>
+          <p:style>
+            <a:lnRef idx="2">
+              <a:schemeClr val="accent1">
+                <a:shade val="50000"/>
+              </a:schemeClr>
+            </a:lnRef>
+            <a:fillRef idx="1">
+              <a:schemeClr val="accent1"/>
+            </a:fillRef>
+            <a:effectRef idx="0">
+              <a:schemeClr val="accent1"/>
+            </a:effectRef>
+            <a:fontRef idx="minor">
+              <a:schemeClr val="lt1"/>
+            </a:fontRef>
+          </p:style>
+          <p:txBody>
+            <a:bodyPr rtlCol="0" anchor="ctr"/>
+            <a:lstStyle/>
+            <a:p>
+              <a:pPr algn="ctr"/>
+              <a:endParaRPr lang="ko-KR" altLang="en-US"/>
+            </a:p>
+          </p:txBody>
+        </p:sp>
+        <p:sp>
+          <p:nvSpPr>
+            <p:cNvPr id="28" name="순서도: 데이터 27">
+              <a:extLst>
+                <a:ext uri="{FF2B5EF4-FFF2-40B4-BE49-F238E27FC236}">
+                  <a16:creationId xmlns:a16="http://schemas.microsoft.com/office/drawing/2014/main" id="{45B7A620-6D6C-4F99-9CFB-A529DE02813F}"/>
+                </a:ext>
+              </a:extLst>
+            </p:cNvPr>
+            <p:cNvSpPr/>
+            <p:nvPr/>
+          </p:nvSpPr>
+          <p:spPr>
+            <a:xfrm>
+              <a:off x="5332887" y="2715199"/>
+              <a:ext cx="432000" cy="324000"/>
+            </a:xfrm>
+            <a:prstGeom prst="flowChartInputOutput">
+              <a:avLst/>
+            </a:prstGeom>
+            <a:solidFill>
+              <a:schemeClr val="bg2"/>
+            </a:solidFill>
+            <a:ln>
+              <a:solidFill>
+                <a:schemeClr val="bg1">
+                  <a:lumMod val="50000"/>
+                </a:schemeClr>
+              </a:solidFill>
+            </a:ln>
+          </p:spPr>
+          <p:style>
+            <a:lnRef idx="2">
+              <a:schemeClr val="accent1">
+                <a:shade val="50000"/>
+              </a:schemeClr>
+            </a:lnRef>
+            <a:fillRef idx="1">
+              <a:schemeClr val="accent1"/>
+            </a:fillRef>
+            <a:effectRef idx="0">
+              <a:schemeClr val="accent1"/>
+            </a:effectRef>
+            <a:fontRef idx="minor">
+              <a:schemeClr val="lt1"/>
+            </a:fontRef>
+          </p:style>
+          <p:txBody>
+            <a:bodyPr rtlCol="0" anchor="ctr"/>
+            <a:lstStyle/>
+            <a:p>
+              <a:pPr algn="ctr"/>
+              <a:endParaRPr lang="ko-KR" altLang="en-US"/>
+            </a:p>
+          </p:txBody>
+        </p:sp>
+        <p:sp>
+          <p:nvSpPr>
+            <p:cNvPr id="29" name="순서도: 데이터 28">
+              <a:extLst>
+                <a:ext uri="{FF2B5EF4-FFF2-40B4-BE49-F238E27FC236}">
+                  <a16:creationId xmlns:a16="http://schemas.microsoft.com/office/drawing/2014/main" id="{4DD7E4CA-4584-4398-8AC7-8FF38B9F13ED}"/>
+                </a:ext>
+              </a:extLst>
+            </p:cNvPr>
+            <p:cNvSpPr/>
+            <p:nvPr/>
+          </p:nvSpPr>
+          <p:spPr>
+            <a:xfrm>
+              <a:off x="5731020" y="2715199"/>
+              <a:ext cx="432000" cy="324000"/>
+            </a:xfrm>
+            <a:prstGeom prst="flowChartInputOutput">
+              <a:avLst/>
+            </a:prstGeom>
+            <a:solidFill>
+              <a:schemeClr val="bg2"/>
+            </a:solidFill>
+            <a:ln>
+              <a:solidFill>
+                <a:schemeClr val="bg1">
+                  <a:lumMod val="50000"/>
+                </a:schemeClr>
+              </a:solidFill>
+            </a:ln>
+          </p:spPr>
+          <p:style>
+            <a:lnRef idx="2">
+              <a:schemeClr val="accent1">
+                <a:shade val="50000"/>
+              </a:schemeClr>
+            </a:lnRef>
+            <a:fillRef idx="1">
+              <a:schemeClr val="accent1"/>
+            </a:fillRef>
+            <a:effectRef idx="0">
+              <a:schemeClr val="accent1"/>
+            </a:effectRef>
+            <a:fontRef idx="minor">
+              <a:schemeClr val="lt1"/>
+            </a:fontRef>
+          </p:style>
+          <p:txBody>
+            <a:bodyPr rtlCol="0" anchor="ctr"/>
+            <a:lstStyle/>
+            <a:p>
+              <a:pPr algn="ctr"/>
+              <a:endParaRPr lang="ko-KR" altLang="en-US"/>
+            </a:p>
+          </p:txBody>
+        </p:sp>
+        <p:sp>
+          <p:nvSpPr>
+            <p:cNvPr id="30" name="순서도: 데이터 29">
+              <a:extLst>
+                <a:ext uri="{FF2B5EF4-FFF2-40B4-BE49-F238E27FC236}">
+                  <a16:creationId xmlns:a16="http://schemas.microsoft.com/office/drawing/2014/main" id="{A6889FAB-85A5-4AE5-B101-48692C6CBAF5}"/>
+                </a:ext>
+              </a:extLst>
+            </p:cNvPr>
+            <p:cNvSpPr/>
+            <p:nvPr/>
+          </p:nvSpPr>
+          <p:spPr>
+            <a:xfrm>
+              <a:off x="6129153" y="2715199"/>
+              <a:ext cx="432000" cy="324000"/>
+            </a:xfrm>
+            <a:prstGeom prst="flowChartInputOutput">
+              <a:avLst/>
+            </a:prstGeom>
+            <a:solidFill>
+              <a:schemeClr val="bg2"/>
+            </a:solidFill>
+            <a:ln>
+              <a:solidFill>
+                <a:schemeClr val="bg1">
+                  <a:lumMod val="50000"/>
+                </a:schemeClr>
+              </a:solidFill>
+            </a:ln>
+          </p:spPr>
+          <p:style>
+            <a:lnRef idx="2">
+              <a:schemeClr val="accent1">
+                <a:shade val="50000"/>
+              </a:schemeClr>
+            </a:lnRef>
+            <a:fillRef idx="1">
+              <a:schemeClr val="accent1"/>
+            </a:fillRef>
+            <a:effectRef idx="0">
+              <a:schemeClr val="accent1"/>
+            </a:effectRef>
+            <a:fontRef idx="minor">
+              <a:schemeClr val="lt1"/>
+            </a:fontRef>
+          </p:style>
+          <p:txBody>
+            <a:bodyPr rtlCol="0" anchor="ctr"/>
+            <a:lstStyle/>
+            <a:p>
+              <a:pPr algn="ctr"/>
+              <a:endParaRPr lang="ko-KR" altLang="en-US"/>
+            </a:p>
+          </p:txBody>
+        </p:sp>
+        <p:cxnSp>
+          <p:nvCxnSpPr>
+            <p:cNvPr id="47" name="직선 화살표 연결선 46">
+              <a:extLst>
+                <a:ext uri="{FF2B5EF4-FFF2-40B4-BE49-F238E27FC236}">
+                  <a16:creationId xmlns:a16="http://schemas.microsoft.com/office/drawing/2014/main" id="{74A4A4AC-906D-4EEB-90CE-44C4D3B8BFF3}"/>
+                </a:ext>
+              </a:extLst>
+            </p:cNvPr>
+            <p:cNvCxnSpPr/>
+            <p:nvPr/>
+          </p:nvCxnSpPr>
+          <p:spPr>
+            <a:xfrm>
+              <a:off x="3962400" y="2219818"/>
+              <a:ext cx="675822" cy="0"/>
+            </a:xfrm>
+            <a:prstGeom prst="straightConnector1">
+              <a:avLst/>
+            </a:prstGeom>
+            <a:ln w="28575">
+              <a:solidFill>
+                <a:schemeClr val="tx1">
+                  <a:lumMod val="50000"/>
+                  <a:lumOff val="50000"/>
+                </a:schemeClr>
+              </a:solidFill>
+              <a:tailEnd type="triangle"/>
+            </a:ln>
+          </p:spPr>
+          <p:style>
+            <a:lnRef idx="1">
+              <a:schemeClr val="accent1"/>
+            </a:lnRef>
+            <a:fillRef idx="0">
+              <a:schemeClr val="accent1"/>
+            </a:fillRef>
+            <a:effectRef idx="0">
+              <a:schemeClr val="accent1"/>
+            </a:effectRef>
+            <a:fontRef idx="minor">
+              <a:schemeClr val="tx1"/>
+            </a:fontRef>
+          </p:style>
+        </p:cxnSp>
+        <p:sp>
+          <p:nvSpPr>
+            <p:cNvPr id="49" name="TextBox 48">
+              <a:extLst>
+                <a:ext uri="{FF2B5EF4-FFF2-40B4-BE49-F238E27FC236}">
+                  <a16:creationId xmlns:a16="http://schemas.microsoft.com/office/drawing/2014/main" id="{446050B1-0932-4567-ACB4-A51C12802CFF}"/>
+                </a:ext>
+              </a:extLst>
+            </p:cNvPr>
+            <p:cNvSpPr txBox="1"/>
+            <p:nvPr/>
+          </p:nvSpPr>
+          <p:spPr>
+            <a:xfrm>
+              <a:off x="5150754" y="1235310"/>
+              <a:ext cx="1106713" cy="338554"/>
+            </a:xfrm>
+            <a:prstGeom prst="rect">
+              <a:avLst/>
+            </a:prstGeom>
+            <a:noFill/>
+          </p:spPr>
+          <p:txBody>
+            <a:bodyPr wrap="none" rtlCol="0">
+              <a:spAutoFit/>
+            </a:bodyPr>
+            <a:lstStyle/>
+            <a:p>
+              <a:r>
+                <a:rPr lang="en-US" altLang="ko-KR" sz="1600" dirty="0" err="1"/>
+                <a:t>feature_m</a:t>
+              </a:r>
+              <a:endParaRPr lang="ko-KR" altLang="en-US" sz="1600" dirty="0"/>
+            </a:p>
+          </p:txBody>
+        </p:sp>
+      </p:grpSp>
+    </p:spTree>
+    <p:extLst>
+      <p:ext uri="{BB962C8B-B14F-4D97-AF65-F5344CB8AC3E}">
+        <p14:creationId xmlns:p14="http://schemas.microsoft.com/office/powerpoint/2010/main" val="3472924257"/>
+      </p:ext>
+    </p:extLst>
+  </p:cSld>
+  <p:clrMapOvr>
+    <a:masterClrMapping/>
+  </p:clrMapOvr>
+</p:sld>
+</file>
+
 <file path=ppt/theme/theme1.xml><?xml version="1.0" encoding="utf-8"?>
 <a:theme xmlns:a="http://schemas.openxmlformats.org/drawingml/2006/main" name="Office 테마">
   <a:themeElements>

</xml_diff>

<commit_message>
(det) update kitti tfrecord: crop and resize process
</commit_message>
<xml_diff>
--- a/assets/detector/figures.pptx
+++ b/assets/detector/figures.pptx
@@ -11,6 +11,7 @@
     <p:sldId id="259" r:id="rId5"/>
     <p:sldId id="260" r:id="rId6"/>
     <p:sldId id="261" r:id="rId7"/>
+    <p:sldId id="262" r:id="rId8"/>
   </p:sldIdLst>
   <p:sldSz cx="12192000" cy="6858000"/>
   <p:notesSz cx="6858000" cy="9144000"/>
@@ -276,7 +277,7 @@
           <a:p>
             <a:fld id="{B14EE84C-1BA9-492D-BEBF-4AB0B5FCE851}" type="datetimeFigureOut">
               <a:rPr lang="ko-KR" altLang="en-US" smtClean="0"/>
-              <a:t>2021-04-06</a:t>
+              <a:t>2021-04-18</a:t>
             </a:fld>
             <a:endParaRPr lang="ko-KR" altLang="en-US"/>
           </a:p>
@@ -474,7 +475,7 @@
           <a:p>
             <a:fld id="{B14EE84C-1BA9-492D-BEBF-4AB0B5FCE851}" type="datetimeFigureOut">
               <a:rPr lang="ko-KR" altLang="en-US" smtClean="0"/>
-              <a:t>2021-04-06</a:t>
+              <a:t>2021-04-18</a:t>
             </a:fld>
             <a:endParaRPr lang="ko-KR" altLang="en-US"/>
           </a:p>
@@ -682,7 +683,7 @@
           <a:p>
             <a:fld id="{B14EE84C-1BA9-492D-BEBF-4AB0B5FCE851}" type="datetimeFigureOut">
               <a:rPr lang="ko-KR" altLang="en-US" smtClean="0"/>
-              <a:t>2021-04-06</a:t>
+              <a:t>2021-04-18</a:t>
             </a:fld>
             <a:endParaRPr lang="ko-KR" altLang="en-US"/>
           </a:p>
@@ -880,7 +881,7 @@
           <a:p>
             <a:fld id="{B14EE84C-1BA9-492D-BEBF-4AB0B5FCE851}" type="datetimeFigureOut">
               <a:rPr lang="ko-KR" altLang="en-US" smtClean="0"/>
-              <a:t>2021-04-06</a:t>
+              <a:t>2021-04-18</a:t>
             </a:fld>
             <a:endParaRPr lang="ko-KR" altLang="en-US"/>
           </a:p>
@@ -1155,7 +1156,7 @@
           <a:p>
             <a:fld id="{B14EE84C-1BA9-492D-BEBF-4AB0B5FCE851}" type="datetimeFigureOut">
               <a:rPr lang="ko-KR" altLang="en-US" smtClean="0"/>
-              <a:t>2021-04-06</a:t>
+              <a:t>2021-04-18</a:t>
             </a:fld>
             <a:endParaRPr lang="ko-KR" altLang="en-US"/>
           </a:p>
@@ -1420,7 +1421,7 @@
           <a:p>
             <a:fld id="{B14EE84C-1BA9-492D-BEBF-4AB0B5FCE851}" type="datetimeFigureOut">
               <a:rPr lang="ko-KR" altLang="en-US" smtClean="0"/>
-              <a:t>2021-04-06</a:t>
+              <a:t>2021-04-18</a:t>
             </a:fld>
             <a:endParaRPr lang="ko-KR" altLang="en-US"/>
           </a:p>
@@ -1832,7 +1833,7 @@
           <a:p>
             <a:fld id="{B14EE84C-1BA9-492D-BEBF-4AB0B5FCE851}" type="datetimeFigureOut">
               <a:rPr lang="ko-KR" altLang="en-US" smtClean="0"/>
-              <a:t>2021-04-06</a:t>
+              <a:t>2021-04-18</a:t>
             </a:fld>
             <a:endParaRPr lang="ko-KR" altLang="en-US"/>
           </a:p>
@@ -1973,7 +1974,7 @@
           <a:p>
             <a:fld id="{B14EE84C-1BA9-492D-BEBF-4AB0B5FCE851}" type="datetimeFigureOut">
               <a:rPr lang="ko-KR" altLang="en-US" smtClean="0"/>
-              <a:t>2021-04-06</a:t>
+              <a:t>2021-04-18</a:t>
             </a:fld>
             <a:endParaRPr lang="ko-KR" altLang="en-US"/>
           </a:p>
@@ -2086,7 +2087,7 @@
           <a:p>
             <a:fld id="{B14EE84C-1BA9-492D-BEBF-4AB0B5FCE851}" type="datetimeFigureOut">
               <a:rPr lang="ko-KR" altLang="en-US" smtClean="0"/>
-              <a:t>2021-04-06</a:t>
+              <a:t>2021-04-18</a:t>
             </a:fld>
             <a:endParaRPr lang="ko-KR" altLang="en-US"/>
           </a:p>
@@ -2397,7 +2398,7 @@
           <a:p>
             <a:fld id="{B14EE84C-1BA9-492D-BEBF-4AB0B5FCE851}" type="datetimeFigureOut">
               <a:rPr lang="ko-KR" altLang="en-US" smtClean="0"/>
-              <a:t>2021-04-06</a:t>
+              <a:t>2021-04-18</a:t>
             </a:fld>
             <a:endParaRPr lang="ko-KR" altLang="en-US"/>
           </a:p>
@@ -2685,7 +2686,7 @@
           <a:p>
             <a:fld id="{B14EE84C-1BA9-492D-BEBF-4AB0B5FCE851}" type="datetimeFigureOut">
               <a:rPr lang="ko-KR" altLang="en-US" smtClean="0"/>
-              <a:t>2021-04-06</a:t>
+              <a:t>2021-04-18</a:t>
             </a:fld>
             <a:endParaRPr lang="ko-KR" altLang="en-US"/>
           </a:p>
@@ -2926,7 +2927,7 @@
           <a:p>
             <a:fld id="{B14EE84C-1BA9-492D-BEBF-4AB0B5FCE851}" type="datetimeFigureOut">
               <a:rPr lang="ko-KR" altLang="en-US" smtClean="0"/>
-              <a:t>2021-04-06</a:t>
+              <a:t>2021-04-18</a:t>
             </a:fld>
             <a:endParaRPr lang="ko-KR" altLang="en-US"/>
           </a:p>
@@ -13590,6 +13591,508 @@
 </p:sld>
 </file>
 
+<file path=ppt/slides/slide7.xml><?xml version="1.0" encoding="utf-8"?>
+<p:sld xmlns:a="http://schemas.openxmlformats.org/drawingml/2006/main" xmlns:r="http://schemas.openxmlformats.org/officeDocument/2006/relationships" xmlns:p="http://schemas.openxmlformats.org/presentationml/2006/main">
+  <p:cSld>
+    <p:spTree>
+      <p:nvGrpSpPr>
+        <p:cNvPr id="1" name=""/>
+        <p:cNvGrpSpPr/>
+        <p:nvPr/>
+      </p:nvGrpSpPr>
+      <p:grpSpPr>
+        <a:xfrm>
+          <a:off x="0" y="0"/>
+          <a:ext cx="0" cy="0"/>
+          <a:chOff x="0" y="0"/>
+          <a:chExt cx="0" cy="0"/>
+        </a:xfrm>
+      </p:grpSpPr>
+      <p:sp>
+        <p:nvSpPr>
+          <p:cNvPr id="3" name="직사각형 2">
+            <a:extLst>
+              <a:ext uri="{FF2B5EF4-FFF2-40B4-BE49-F238E27FC236}">
+                <a16:creationId xmlns:a16="http://schemas.microsoft.com/office/drawing/2014/main" id="{D1A22005-E4FE-4C73-84CC-1BF652D135DF}"/>
+              </a:ext>
+            </a:extLst>
+          </p:cNvPr>
+          <p:cNvSpPr/>
+          <p:nvPr/>
+        </p:nvSpPr>
+        <p:spPr>
+          <a:xfrm>
+            <a:off x="1596000" y="1404000"/>
+            <a:ext cx="9000000" cy="4320000"/>
+          </a:xfrm>
+          <a:prstGeom prst="rect">
+            <a:avLst/>
+          </a:prstGeom>
+        </p:spPr>
+        <p:style>
+          <a:lnRef idx="2">
+            <a:schemeClr val="accent1">
+              <a:shade val="50000"/>
+            </a:schemeClr>
+          </a:lnRef>
+          <a:fillRef idx="1">
+            <a:schemeClr val="accent1"/>
+          </a:fillRef>
+          <a:effectRef idx="0">
+            <a:schemeClr val="accent1"/>
+          </a:effectRef>
+          <a:fontRef idx="minor">
+            <a:schemeClr val="lt1"/>
+          </a:fontRef>
+        </p:style>
+        <p:txBody>
+          <a:bodyPr rtlCol="0" anchor="ctr"/>
+          <a:lstStyle/>
+          <a:p>
+            <a:pPr algn="ctr"/>
+            <a:endParaRPr lang="ko-KR" altLang="en-US"/>
+          </a:p>
+        </p:txBody>
+      </p:sp>
+      <p:sp>
+        <p:nvSpPr>
+          <p:cNvPr id="4" name="직사각형 3">
+            <a:extLst>
+              <a:ext uri="{FF2B5EF4-FFF2-40B4-BE49-F238E27FC236}">
+                <a16:creationId xmlns:a16="http://schemas.microsoft.com/office/drawing/2014/main" id="{C162B195-2D71-4257-9B84-3E8D96DBF14F}"/>
+              </a:ext>
+            </a:extLst>
+          </p:cNvPr>
+          <p:cNvSpPr/>
+          <p:nvPr/>
+        </p:nvSpPr>
+        <p:spPr>
+          <a:xfrm>
+            <a:off x="1776000" y="1854000"/>
+            <a:ext cx="8640000" cy="3600000"/>
+          </a:xfrm>
+          <a:prstGeom prst="rect">
+            <a:avLst/>
+          </a:prstGeom>
+          <a:solidFill>
+            <a:schemeClr val="accent6"/>
+          </a:solidFill>
+        </p:spPr>
+        <p:style>
+          <a:lnRef idx="2">
+            <a:schemeClr val="accent1">
+              <a:shade val="50000"/>
+            </a:schemeClr>
+          </a:lnRef>
+          <a:fillRef idx="1">
+            <a:schemeClr val="accent1"/>
+          </a:fillRef>
+          <a:effectRef idx="0">
+            <a:schemeClr val="accent1"/>
+          </a:effectRef>
+          <a:fontRef idx="minor">
+            <a:schemeClr val="lt1"/>
+          </a:fontRef>
+        </p:style>
+        <p:txBody>
+          <a:bodyPr rtlCol="0" anchor="ctr"/>
+          <a:lstStyle/>
+          <a:p>
+            <a:pPr algn="ctr"/>
+            <a:endParaRPr lang="ko-KR" altLang="en-US"/>
+          </a:p>
+        </p:txBody>
+      </p:sp>
+      <p:sp>
+        <p:nvSpPr>
+          <p:cNvPr id="5" name="TextBox 4">
+            <a:extLst>
+              <a:ext uri="{FF2B5EF4-FFF2-40B4-BE49-F238E27FC236}">
+                <a16:creationId xmlns:a16="http://schemas.microsoft.com/office/drawing/2014/main" id="{7D500E28-D45B-4862-8C1E-31303BA292B8}"/>
+              </a:ext>
+            </a:extLst>
+          </p:cNvPr>
+          <p:cNvSpPr txBox="1"/>
+          <p:nvPr/>
+        </p:nvSpPr>
+        <p:spPr>
+          <a:xfrm>
+            <a:off x="5420847" y="1444334"/>
+            <a:ext cx="1350306" cy="369332"/>
+          </a:xfrm>
+          <a:prstGeom prst="rect">
+            <a:avLst/>
+          </a:prstGeom>
+          <a:noFill/>
+        </p:spPr>
+        <p:txBody>
+          <a:bodyPr wrap="none" rtlCol="0">
+            <a:spAutoFit/>
+          </a:bodyPr>
+          <a:lstStyle/>
+          <a:p>
+            <a:pPr algn="ctr"/>
+            <a:r>
+              <a:rPr lang="en-US" altLang="ko-KR" dirty="0">
+                <a:solidFill>
+                  <a:schemeClr val="bg1"/>
+                </a:solidFill>
+              </a:rPr>
+              <a:t>Crop</a:t>
+            </a:r>
+            <a:r>
+              <a:rPr lang="ko-KR" altLang="en-US" dirty="0">
+                <a:solidFill>
+                  <a:schemeClr val="bg1"/>
+                </a:solidFill>
+              </a:rPr>
+              <a:t> </a:t>
+            </a:r>
+            <a:r>
+              <a:rPr lang="en-US" altLang="ko-KR" dirty="0">
+                <a:solidFill>
+                  <a:schemeClr val="bg1"/>
+                </a:solidFill>
+              </a:rPr>
+              <a:t>offset</a:t>
+            </a:r>
+            <a:endParaRPr lang="ko-KR" altLang="en-US" dirty="0">
+              <a:solidFill>
+                <a:schemeClr val="bg1"/>
+              </a:solidFill>
+            </a:endParaRPr>
+          </a:p>
+        </p:txBody>
+      </p:sp>
+      <p:sp>
+        <p:nvSpPr>
+          <p:cNvPr id="6" name="직사각형 5">
+            <a:extLst>
+              <a:ext uri="{FF2B5EF4-FFF2-40B4-BE49-F238E27FC236}">
+                <a16:creationId xmlns:a16="http://schemas.microsoft.com/office/drawing/2014/main" id="{4B1F214C-2EB9-4EF8-8140-00C5B18629C8}"/>
+              </a:ext>
+            </a:extLst>
+          </p:cNvPr>
+          <p:cNvSpPr/>
+          <p:nvPr/>
+        </p:nvSpPr>
+        <p:spPr>
+          <a:xfrm>
+            <a:off x="2496000" y="1854000"/>
+            <a:ext cx="7200000" cy="3600000"/>
+          </a:xfrm>
+          <a:prstGeom prst="rect">
+            <a:avLst/>
+          </a:prstGeom>
+          <a:solidFill>
+            <a:schemeClr val="accent4">
+              <a:lumMod val="20000"/>
+              <a:lumOff val="80000"/>
+            </a:schemeClr>
+          </a:solidFill>
+        </p:spPr>
+        <p:style>
+          <a:lnRef idx="2">
+            <a:schemeClr val="accent1">
+              <a:shade val="50000"/>
+            </a:schemeClr>
+          </a:lnRef>
+          <a:fillRef idx="1">
+            <a:schemeClr val="accent1"/>
+          </a:fillRef>
+          <a:effectRef idx="0">
+            <a:schemeClr val="accent1"/>
+          </a:effectRef>
+          <a:fontRef idx="minor">
+            <a:schemeClr val="lt1"/>
+          </a:fontRef>
+        </p:style>
+        <p:txBody>
+          <a:bodyPr rtlCol="0" anchor="ctr"/>
+          <a:lstStyle/>
+          <a:p>
+            <a:pPr algn="ctr"/>
+            <a:endParaRPr lang="ko-KR" altLang="en-US"/>
+          </a:p>
+        </p:txBody>
+      </p:sp>
+      <p:sp>
+        <p:nvSpPr>
+          <p:cNvPr id="7" name="TextBox 6">
+            <a:extLst>
+              <a:ext uri="{FF2B5EF4-FFF2-40B4-BE49-F238E27FC236}">
+                <a16:creationId xmlns:a16="http://schemas.microsoft.com/office/drawing/2014/main" id="{31C6D3C3-C4D7-4934-9119-225CB6754911}"/>
+              </a:ext>
+            </a:extLst>
+          </p:cNvPr>
+          <p:cNvSpPr txBox="1"/>
+          <p:nvPr/>
+        </p:nvSpPr>
+        <p:spPr>
+          <a:xfrm>
+            <a:off x="9679852" y="2474064"/>
+            <a:ext cx="806567" cy="1200329"/>
+          </a:xfrm>
+          <a:prstGeom prst="rect">
+            <a:avLst/>
+          </a:prstGeom>
+          <a:noFill/>
+        </p:spPr>
+        <p:txBody>
+          <a:bodyPr wrap="none" rtlCol="0">
+            <a:spAutoFit/>
+          </a:bodyPr>
+          <a:lstStyle/>
+          <a:p>
+            <a:pPr algn="ctr"/>
+            <a:r>
+              <a:rPr lang="en-US" altLang="ko-KR" dirty="0">
+                <a:solidFill>
+                  <a:schemeClr val="bg1"/>
+                </a:solidFill>
+              </a:rPr>
+              <a:t>Crop</a:t>
+            </a:r>
+            <a:r>
+              <a:rPr lang="ko-KR" altLang="en-US" dirty="0">
+                <a:solidFill>
+                  <a:schemeClr val="bg1"/>
+                </a:solidFill>
+              </a:rPr>
+              <a:t> </a:t>
+            </a:r>
+            <a:endParaRPr lang="en-US" altLang="ko-KR" dirty="0">
+              <a:solidFill>
+                <a:schemeClr val="bg1"/>
+              </a:solidFill>
+            </a:endParaRPr>
+          </a:p>
+          <a:p>
+            <a:pPr algn="ctr"/>
+            <a:r>
+              <a:rPr lang="en-US" altLang="ko-KR" dirty="0">
+                <a:solidFill>
+                  <a:schemeClr val="bg1"/>
+                </a:solidFill>
+              </a:rPr>
+              <a:t>to</a:t>
+            </a:r>
+          </a:p>
+          <a:p>
+            <a:pPr algn="ctr"/>
+            <a:r>
+              <a:rPr lang="en-US" altLang="ko-KR" dirty="0">
+                <a:solidFill>
+                  <a:schemeClr val="bg1"/>
+                </a:solidFill>
+              </a:rPr>
+              <a:t>target</a:t>
+            </a:r>
+          </a:p>
+          <a:p>
+            <a:pPr algn="ctr"/>
+            <a:r>
+              <a:rPr lang="en-US" altLang="ko-KR" dirty="0">
+                <a:solidFill>
+                  <a:schemeClr val="bg1"/>
+                </a:solidFill>
+              </a:rPr>
+              <a:t>ratio</a:t>
+            </a:r>
+          </a:p>
+        </p:txBody>
+      </p:sp>
+      <p:sp>
+        <p:nvSpPr>
+          <p:cNvPr id="9" name="직사각형 8">
+            <a:extLst>
+              <a:ext uri="{FF2B5EF4-FFF2-40B4-BE49-F238E27FC236}">
+                <a16:creationId xmlns:a16="http://schemas.microsoft.com/office/drawing/2014/main" id="{891D03D9-A2CE-401C-9C43-9D13582A591F}"/>
+              </a:ext>
+            </a:extLst>
+          </p:cNvPr>
+          <p:cNvSpPr/>
+          <p:nvPr/>
+        </p:nvSpPr>
+        <p:spPr>
+          <a:xfrm>
+            <a:off x="3216000" y="2214000"/>
+            <a:ext cx="5760000" cy="2880000"/>
+          </a:xfrm>
+          <a:prstGeom prst="rect">
+            <a:avLst/>
+          </a:prstGeom>
+          <a:solidFill>
+            <a:schemeClr val="accent2"/>
+          </a:solidFill>
+        </p:spPr>
+        <p:style>
+          <a:lnRef idx="2">
+            <a:schemeClr val="accent1">
+              <a:shade val="50000"/>
+            </a:schemeClr>
+          </a:lnRef>
+          <a:fillRef idx="1">
+            <a:schemeClr val="accent1"/>
+          </a:fillRef>
+          <a:effectRef idx="0">
+            <a:schemeClr val="accent1"/>
+          </a:effectRef>
+          <a:fontRef idx="minor">
+            <a:schemeClr val="lt1"/>
+          </a:fontRef>
+        </p:style>
+        <p:txBody>
+          <a:bodyPr rtlCol="0" anchor="ctr"/>
+          <a:lstStyle/>
+          <a:p>
+            <a:pPr algn="ctr"/>
+            <a:endParaRPr lang="ko-KR" altLang="en-US"/>
+          </a:p>
+        </p:txBody>
+      </p:sp>
+      <p:cxnSp>
+        <p:nvCxnSpPr>
+          <p:cNvPr id="11" name="직선 연결선 10">
+            <a:extLst>
+              <a:ext uri="{FF2B5EF4-FFF2-40B4-BE49-F238E27FC236}">
+                <a16:creationId xmlns:a16="http://schemas.microsoft.com/office/drawing/2014/main" id="{FA41A1D0-03AF-4CE7-BFA6-FEED62F36614}"/>
+              </a:ext>
+            </a:extLst>
+          </p:cNvPr>
+          <p:cNvCxnSpPr/>
+          <p:nvPr/>
+        </p:nvCxnSpPr>
+        <p:spPr>
+          <a:xfrm flipV="1">
+            <a:off x="2496000" y="1854000"/>
+            <a:ext cx="7200000" cy="3600000"/>
+          </a:xfrm>
+          <a:prstGeom prst="line">
+            <a:avLst/>
+          </a:prstGeom>
+          <a:ln>
+            <a:solidFill>
+              <a:schemeClr val="tx1"/>
+            </a:solidFill>
+            <a:prstDash val="lgDash"/>
+            <a:headEnd type="arrow" w="med" len="med"/>
+            <a:tailEnd type="arrow" w="med" len="med"/>
+          </a:ln>
+        </p:spPr>
+        <p:style>
+          <a:lnRef idx="1">
+            <a:schemeClr val="accent1"/>
+          </a:lnRef>
+          <a:fillRef idx="0">
+            <a:schemeClr val="accent1"/>
+          </a:fillRef>
+          <a:effectRef idx="0">
+            <a:schemeClr val="accent1"/>
+          </a:effectRef>
+          <a:fontRef idx="minor">
+            <a:schemeClr val="tx1"/>
+          </a:fontRef>
+        </p:style>
+      </p:cxnSp>
+      <p:sp>
+        <p:nvSpPr>
+          <p:cNvPr id="12" name="TextBox 11">
+            <a:extLst>
+              <a:ext uri="{FF2B5EF4-FFF2-40B4-BE49-F238E27FC236}">
+                <a16:creationId xmlns:a16="http://schemas.microsoft.com/office/drawing/2014/main" id="{90E4BEB5-2E22-419B-8333-30FBDC3CD98E}"/>
+              </a:ext>
+            </a:extLst>
+          </p:cNvPr>
+          <p:cNvSpPr txBox="1"/>
+          <p:nvPr/>
+        </p:nvSpPr>
+        <p:spPr>
+          <a:xfrm>
+            <a:off x="5681753" y="1857501"/>
+            <a:ext cx="828497" cy="369332"/>
+          </a:xfrm>
+          <a:prstGeom prst="rect">
+            <a:avLst/>
+          </a:prstGeom>
+          <a:noFill/>
+        </p:spPr>
+        <p:txBody>
+          <a:bodyPr wrap="none" rtlCol="0">
+            <a:spAutoFit/>
+          </a:bodyPr>
+          <a:lstStyle/>
+          <a:p>
+            <a:pPr algn="ctr"/>
+            <a:r>
+              <a:rPr lang="en-US" altLang="ko-KR" dirty="0">
+                <a:solidFill>
+                  <a:sysClr val="windowText" lastClr="000000"/>
+                </a:solidFill>
+              </a:rPr>
+              <a:t>Resize</a:t>
+            </a:r>
+          </a:p>
+        </p:txBody>
+      </p:sp>
+      <p:sp>
+        <p:nvSpPr>
+          <p:cNvPr id="13" name="TextBox 12">
+            <a:extLst>
+              <a:ext uri="{FF2B5EF4-FFF2-40B4-BE49-F238E27FC236}">
+                <a16:creationId xmlns:a16="http://schemas.microsoft.com/office/drawing/2014/main" id="{C045D118-E84B-49ED-99E6-F73EE9C8C31F}"/>
+              </a:ext>
+            </a:extLst>
+          </p:cNvPr>
+          <p:cNvSpPr txBox="1"/>
+          <p:nvPr/>
+        </p:nvSpPr>
+        <p:spPr>
+          <a:xfrm>
+            <a:off x="5125640" y="3469334"/>
+            <a:ext cx="1940724" cy="369332"/>
+          </a:xfrm>
+          <a:prstGeom prst="rect">
+            <a:avLst/>
+          </a:prstGeom>
+          <a:noFill/>
+        </p:spPr>
+        <p:txBody>
+          <a:bodyPr wrap="none" rtlCol="0">
+            <a:spAutoFit/>
+          </a:bodyPr>
+          <a:lstStyle/>
+          <a:p>
+            <a:pPr algn="ctr"/>
+            <a:r>
+              <a:rPr lang="en-US" altLang="ko-KR" dirty="0">
+                <a:solidFill>
+                  <a:schemeClr val="bg1"/>
+                </a:solidFill>
+              </a:rPr>
+              <a:t>Target resolution</a:t>
+            </a:r>
+            <a:endParaRPr lang="ko-KR" altLang="en-US" dirty="0">
+              <a:solidFill>
+                <a:schemeClr val="bg1"/>
+              </a:solidFill>
+            </a:endParaRPr>
+          </a:p>
+        </p:txBody>
+      </p:sp>
+    </p:spTree>
+    <p:extLst>
+      <p:ext uri="{BB962C8B-B14F-4D97-AF65-F5344CB8AC3E}">
+        <p14:creationId xmlns:p14="http://schemas.microsoft.com/office/powerpoint/2010/main" val="3270329054"/>
+      </p:ext>
+    </p:extLst>
+  </p:cSld>
+  <p:clrMapOvr>
+    <a:masterClrMapping/>
+  </p:clrMapOvr>
+</p:sld>
+</file>
+
 <file path=ppt/theme/theme1.xml><?xml version="1.0" encoding="utf-8"?>
 <a:theme xmlns:a="http://schemas.openxmlformats.org/drawingml/2006/main" name="Office 테마">
   <a:themeElements>

</xml_diff>